<commit_message>
Added IDEs / editors that are banned
</commit_message>
<xml_diff>
--- a/Python Level 2/Lesson 1/Session 1.pptx
+++ b/Python Level 2/Lesson 1/Session 1.pptx
@@ -206,7 +206,7 @@
           <a:p>
             <a:fld id="{E700A533-32BB-7A4E-AE6B-F0A2BE39E8B0}" type="datetimeFigureOut">
               <a:rPr lang="en-US" smtClean="0"/>
-              <a:t>9/21/16</a:t>
+              <a:t>9/11/17</a:t>
             </a:fld>
             <a:endParaRPr lang="en-US"/>
           </a:p>
@@ -697,7 +697,7 @@
           <a:p>
             <a:fld id="{F86DE704-5A85-4041-9FC6-7273780BCBF6}" type="datetimeFigureOut">
               <a:rPr lang="en-US" smtClean="0"/>
-              <a:t>9/21/16</a:t>
+              <a:t>9/11/17</a:t>
             </a:fld>
             <a:endParaRPr lang="en-US"/>
           </a:p>
@@ -867,7 +867,7 @@
           <a:p>
             <a:fld id="{F86DE704-5A85-4041-9FC6-7273780BCBF6}" type="datetimeFigureOut">
               <a:rPr lang="en-US" smtClean="0"/>
-              <a:t>9/21/16</a:t>
+              <a:t>9/11/17</a:t>
             </a:fld>
             <a:endParaRPr lang="en-US"/>
           </a:p>
@@ -1047,7 +1047,7 @@
           <a:p>
             <a:fld id="{F86DE704-5A85-4041-9FC6-7273780BCBF6}" type="datetimeFigureOut">
               <a:rPr lang="en-US" smtClean="0"/>
-              <a:t>9/21/16</a:t>
+              <a:t>9/11/17</a:t>
             </a:fld>
             <a:endParaRPr lang="en-US"/>
           </a:p>
@@ -1217,7 +1217,7 @@
           <a:p>
             <a:fld id="{F86DE704-5A85-4041-9FC6-7273780BCBF6}" type="datetimeFigureOut">
               <a:rPr lang="en-US" smtClean="0"/>
-              <a:t>9/21/16</a:t>
+              <a:t>9/11/17</a:t>
             </a:fld>
             <a:endParaRPr lang="en-US"/>
           </a:p>
@@ -1463,7 +1463,7 @@
           <a:p>
             <a:fld id="{F86DE704-5A85-4041-9FC6-7273780BCBF6}" type="datetimeFigureOut">
               <a:rPr lang="en-US" smtClean="0"/>
-              <a:t>9/21/16</a:t>
+              <a:t>9/11/17</a:t>
             </a:fld>
             <a:endParaRPr lang="en-US"/>
           </a:p>
@@ -1695,7 +1695,7 @@
           <a:p>
             <a:fld id="{F86DE704-5A85-4041-9FC6-7273780BCBF6}" type="datetimeFigureOut">
               <a:rPr lang="en-US" smtClean="0"/>
-              <a:t>9/21/16</a:t>
+              <a:t>9/11/17</a:t>
             </a:fld>
             <a:endParaRPr lang="en-US"/>
           </a:p>
@@ -2062,7 +2062,7 @@
           <a:p>
             <a:fld id="{F86DE704-5A85-4041-9FC6-7273780BCBF6}" type="datetimeFigureOut">
               <a:rPr lang="en-US" smtClean="0"/>
-              <a:t>9/21/16</a:t>
+              <a:t>9/11/17</a:t>
             </a:fld>
             <a:endParaRPr lang="en-US"/>
           </a:p>
@@ -2180,7 +2180,7 @@
           <a:p>
             <a:fld id="{F86DE704-5A85-4041-9FC6-7273780BCBF6}" type="datetimeFigureOut">
               <a:rPr lang="en-US" smtClean="0"/>
-              <a:t>9/21/16</a:t>
+              <a:t>9/11/17</a:t>
             </a:fld>
             <a:endParaRPr lang="en-US"/>
           </a:p>
@@ -2275,7 +2275,7 @@
           <a:p>
             <a:fld id="{F86DE704-5A85-4041-9FC6-7273780BCBF6}" type="datetimeFigureOut">
               <a:rPr lang="en-US" smtClean="0"/>
-              <a:t>9/21/16</a:t>
+              <a:t>9/11/17</a:t>
             </a:fld>
             <a:endParaRPr lang="en-US"/>
           </a:p>
@@ -2552,7 +2552,7 @@
           <a:p>
             <a:fld id="{F86DE704-5A85-4041-9FC6-7273780BCBF6}" type="datetimeFigureOut">
               <a:rPr lang="en-US" smtClean="0"/>
-              <a:t>9/21/16</a:t>
+              <a:t>9/11/17</a:t>
             </a:fld>
             <a:endParaRPr lang="en-US"/>
           </a:p>
@@ -2805,7 +2805,7 @@
           <a:p>
             <a:fld id="{F86DE704-5A85-4041-9FC6-7273780BCBF6}" type="datetimeFigureOut">
               <a:rPr lang="en-US" smtClean="0"/>
-              <a:t>9/21/16</a:t>
+              <a:t>9/11/17</a:t>
             </a:fld>
             <a:endParaRPr lang="en-US"/>
           </a:p>
@@ -3018,7 +3018,7 @@
           <a:p>
             <a:fld id="{F86DE704-5A85-4041-9FC6-7273780BCBF6}" type="datetimeFigureOut">
               <a:rPr lang="en-US" smtClean="0"/>
-              <a:t>9/21/16</a:t>
+              <a:t>9/11/17</a:t>
             </a:fld>
             <a:endParaRPr lang="en-US"/>
           </a:p>
@@ -3508,11 +3508,7 @@
             <a:pPr algn="ctr"/>
             <a:r>
               <a:rPr lang="en-US" sz="2800" dirty="0" smtClean="0"/>
-              <a:t>Session 1</a:t>
-            </a:r>
-            <a:r>
-              <a:rPr lang="en-US" sz="2800" dirty="0" smtClean="0"/>
-              <a:t>: Welcome (back). </a:t>
+              <a:t>Session 1: Welcome (back). </a:t>
             </a:r>
             <a:endParaRPr lang="en-US" sz="2800" dirty="0"/>
           </a:p>
@@ -3619,29 +3615,16 @@
           <a:p>
             <a:r>
               <a:rPr lang="en-US" dirty="0" smtClean="0"/>
-              <a:t>Next </a:t>
-            </a:r>
+              <a:t>Next week: Building a library, no Dewey Decimal system required</a:t>
+            </a:r>
+          </a:p>
+          <a:p>
+            <a:endParaRPr lang="en-US" dirty="0"/>
+          </a:p>
+          <a:p>
             <a:r>
               <a:rPr lang="en-US" dirty="0" smtClean="0"/>
-              <a:t>week: Building a library, </a:t>
-            </a:r>
-            <a:r>
-              <a:rPr lang="en-US" dirty="0" smtClean="0"/>
-              <a:t>no Dewey Decimal system required</a:t>
-            </a:r>
-            <a:endParaRPr lang="en-US" dirty="0" smtClean="0"/>
-          </a:p>
-          <a:p>
-            <a:endParaRPr lang="en-US" dirty="0"/>
-          </a:p>
-          <a:p>
-            <a:r>
-              <a:rPr lang="en-US" dirty="0" smtClean="0"/>
-              <a:t>Drop-in: Mondays, 11am in </a:t>
-            </a:r>
-            <a:r>
-              <a:rPr lang="en-US" dirty="0" smtClean="0"/>
-              <a:t>S32</a:t>
+              <a:t>Drop-in: Mondays, 11am in S32</a:t>
             </a:r>
           </a:p>
           <a:p>
@@ -3656,7 +3639,6 @@
               <a:rPr lang="en-US" dirty="0" smtClean="0"/>
               <a:t>python-additional-eca1</a:t>
             </a:r>
-            <a:endParaRPr lang="en-US" dirty="0" smtClean="0"/>
           </a:p>
         </p:txBody>
       </p:sp>
@@ -3954,8 +3936,34 @@
             </a:br>
             <a:r>
               <a:rPr lang="en-US" dirty="0" smtClean="0"/>
-              <a:t>for Python</a:t>
-            </a:r>
+              <a:t>for </a:t>
+            </a:r>
+            <a:r>
+              <a:rPr lang="en-US" dirty="0" smtClean="0"/>
+              <a:t>Python</a:t>
+            </a:r>
+            <a:endParaRPr lang="en-US" dirty="0"/>
+          </a:p>
+          <a:p>
+            <a:r>
+              <a:rPr lang="en-US" dirty="0" smtClean="0"/>
+              <a:t>Do not use:</a:t>
+            </a:r>
+          </a:p>
+          <a:p>
+            <a:pPr lvl="1"/>
+            <a:r>
+              <a:rPr lang="en-US" dirty="0" smtClean="0"/>
+              <a:t>Notepad</a:t>
+            </a:r>
+          </a:p>
+          <a:p>
+            <a:pPr lvl="1"/>
+            <a:r>
+              <a:rPr lang="en-US" dirty="0" smtClean="0"/>
+              <a:t>Notepad++</a:t>
+            </a:r>
+            <a:endParaRPr lang="en-US" dirty="0"/>
           </a:p>
         </p:txBody>
       </p:sp>
@@ -4082,15 +4090,7 @@
           <a:p>
             <a:r>
               <a:rPr lang="en-US" dirty="0" smtClean="0"/>
-              <a:t>Download it and </a:t>
-            </a:r>
-            <a:r>
-              <a:rPr lang="en-US" dirty="0" smtClean="0"/>
-              <a:t>open it in your </a:t>
-            </a:r>
-            <a:r>
-              <a:rPr lang="en-US" dirty="0" smtClean="0"/>
-              <a:t>preferred editor</a:t>
+              <a:t>Download it and open it in your preferred editor</a:t>
             </a:r>
           </a:p>
           <a:p>
@@ -4386,15 +4386,7 @@
           <a:p>
             <a:r>
               <a:rPr lang="en-US" dirty="0" smtClean="0"/>
-              <a:t>Can you add a restriction to only allow the user to input numbers between 1 and 5 </a:t>
-            </a:r>
-            <a:r>
-              <a:rPr lang="en-US" dirty="0" smtClean="0"/>
-              <a:t>when searching on </a:t>
-            </a:r>
-            <a:r>
-              <a:rPr lang="en-US" dirty="0" smtClean="0"/>
-              <a:t>rating?</a:t>
+              <a:t>Can you add a restriction to only allow the user to input numbers between 1 and 5 when searching on rating?</a:t>
             </a:r>
           </a:p>
         </p:txBody>

</xml_diff>

<commit_message>
Small tweaks, logic bug fix
</commit_message>
<xml_diff>
--- a/Python Level 2/Lesson 1/Session 1.pptx
+++ b/Python Level 2/Lesson 1/Session 1.pptx
@@ -5,19 +5,20 @@
     <p:sldMasterId id="2147483648" r:id="rId1"/>
   </p:sldMasterIdLst>
   <p:notesMasterIdLst>
-    <p:notesMasterId r:id="rId12"/>
+    <p:notesMasterId r:id="rId13"/>
   </p:notesMasterIdLst>
   <p:sldIdLst>
     <p:sldId id="256" r:id="rId2"/>
     <p:sldId id="259" r:id="rId3"/>
-    <p:sldId id="257" r:id="rId4"/>
-    <p:sldId id="260" r:id="rId5"/>
-    <p:sldId id="267" r:id="rId6"/>
-    <p:sldId id="258" r:id="rId7"/>
-    <p:sldId id="261" r:id="rId8"/>
-    <p:sldId id="265" r:id="rId9"/>
-    <p:sldId id="263" r:id="rId10"/>
-    <p:sldId id="266" r:id="rId11"/>
+    <p:sldId id="268" r:id="rId4"/>
+    <p:sldId id="257" r:id="rId5"/>
+    <p:sldId id="260" r:id="rId6"/>
+    <p:sldId id="267" r:id="rId7"/>
+    <p:sldId id="258" r:id="rId8"/>
+    <p:sldId id="261" r:id="rId9"/>
+    <p:sldId id="265" r:id="rId10"/>
+    <p:sldId id="263" r:id="rId11"/>
+    <p:sldId id="266" r:id="rId12"/>
   </p:sldIdLst>
   <p:sldSz cx="12192000" cy="6858000"/>
   <p:notesSz cx="6858000" cy="9144000"/>
@@ -518,6 +519,90 @@
           <a:bodyPr/>
           <a:lstStyle/>
           <a:p>
+            <a:endParaRPr lang="en-US" dirty="0"/>
+          </a:p>
+        </p:txBody>
+      </p:sp>
+      <p:sp>
+        <p:nvSpPr>
+          <p:cNvPr id="4" name="Slide Number Placeholder 3"/>
+          <p:cNvSpPr>
+            <a:spLocks noGrp="1"/>
+          </p:cNvSpPr>
+          <p:nvPr>
+            <p:ph type="sldNum" sz="quarter" idx="10"/>
+          </p:nvPr>
+        </p:nvSpPr>
+        <p:spPr/>
+        <p:txBody>
+          <a:bodyPr/>
+          <a:lstStyle/>
+          <a:p>
+            <a:fld id="{CE4D06AB-E4DB-4A49-93DE-CC1A05FF936A}" type="slidenum">
+              <a:rPr lang="en-US" smtClean="0"/>
+              <a:t>1</a:t>
+            </a:fld>
+            <a:endParaRPr lang="en-US"/>
+          </a:p>
+        </p:txBody>
+      </p:sp>
+    </p:spTree>
+    <p:extLst>
+      <p:ext uri="{BB962C8B-B14F-4D97-AF65-F5344CB8AC3E}">
+        <p14:creationId xmlns:p14="http://schemas.microsoft.com/office/powerpoint/2010/main" val="1683241195"/>
+      </p:ext>
+    </p:extLst>
+  </p:cSld>
+  <p:clrMapOvr>
+    <a:masterClrMapping/>
+  </p:clrMapOvr>
+</p:notes>
+</file>
+
+<file path=ppt/notesSlides/notesSlide2.xml><?xml version="1.0" encoding="utf-8"?>
+<p:notes xmlns:a="http://schemas.openxmlformats.org/drawingml/2006/main" xmlns:r="http://schemas.openxmlformats.org/officeDocument/2006/relationships" xmlns:p="http://schemas.openxmlformats.org/presentationml/2006/main">
+  <p:cSld>
+    <p:spTree>
+      <p:nvGrpSpPr>
+        <p:cNvPr id="1" name=""/>
+        <p:cNvGrpSpPr/>
+        <p:nvPr/>
+      </p:nvGrpSpPr>
+      <p:grpSpPr>
+        <a:xfrm>
+          <a:off x="0" y="0"/>
+          <a:ext cx="0" cy="0"/>
+          <a:chOff x="0" y="0"/>
+          <a:chExt cx="0" cy="0"/>
+        </a:xfrm>
+      </p:grpSpPr>
+      <p:sp>
+        <p:nvSpPr>
+          <p:cNvPr id="2" name="Slide Image Placeholder 1"/>
+          <p:cNvSpPr>
+            <a:spLocks noGrp="1" noRot="1" noChangeAspect="1"/>
+          </p:cNvSpPr>
+          <p:nvPr>
+            <p:ph type="sldImg"/>
+          </p:nvPr>
+        </p:nvSpPr>
+        <p:spPr/>
+      </p:sp>
+      <p:sp>
+        <p:nvSpPr>
+          <p:cNvPr id="3" name="Notes Placeholder 2"/>
+          <p:cNvSpPr>
+            <a:spLocks noGrp="1"/>
+          </p:cNvSpPr>
+          <p:nvPr>
+            <p:ph type="body" idx="1"/>
+          </p:nvPr>
+        </p:nvSpPr>
+        <p:spPr/>
+        <p:txBody>
+          <a:bodyPr/>
+          <a:lstStyle/>
+          <a:p>
             <a:r>
               <a:rPr lang="en-US" dirty="0" smtClean="0"/>
               <a:t>Extra credit: what</a:t>
@@ -547,7 +632,7 @@
           <a:p>
             <a:fld id="{CE4D06AB-E4DB-4A49-93DE-CC1A05FF936A}" type="slidenum">
               <a:rPr lang="en-US" smtClean="0"/>
-              <a:t>10</a:t>
+              <a:t>11</a:t>
             </a:fld>
             <a:endParaRPr lang="en-US"/>
           </a:p>
@@ -3432,7 +3517,7 @@
           <p:nvPr/>
         </p:nvPicPr>
         <p:blipFill>
-          <a:blip r:embed="rId2">
+          <a:blip r:embed="rId3">
             <a:extLst>
               <a:ext uri="{28A0092B-C50C-407E-A947-70E740481C1C}">
                 <a14:useLocalDpi xmlns:a14="http://schemas.microsoft.com/office/drawing/2010/main" val="0"/>
@@ -3524,6 +3609,13 @@
   <p:clrMapOvr>
     <a:masterClrMapping/>
   </p:clrMapOvr>
+  <p:timing>
+    <p:tnLst>
+      <p:par>
+        <p:cTn id="1" dur="indefinite" restart="never" nodeType="tmRoot"/>
+      </p:par>
+    </p:tnLst>
+  </p:timing>
 </p:sld>
 </file>
 
@@ -3554,6 +3646,126 @@
             <p:ph type="title"/>
           </p:nvPr>
         </p:nvSpPr>
+        <p:spPr/>
+        <p:txBody>
+          <a:bodyPr/>
+          <a:lstStyle/>
+          <a:p>
+            <a:pPr algn="ctr"/>
+            <a:r>
+              <a:rPr lang="en-US" dirty="0" smtClean="0"/>
+              <a:t>What does this do?</a:t>
+            </a:r>
+            <a:endParaRPr lang="en-US" dirty="0"/>
+          </a:p>
+        </p:txBody>
+      </p:sp>
+      <p:pic>
+        <p:nvPicPr>
+          <p:cNvPr id="8" name="Content Placeholder 7"/>
+          <p:cNvPicPr>
+            <a:picLocks noGrp="1" noChangeAspect="1"/>
+          </p:cNvPicPr>
+          <p:nvPr>
+            <p:ph idx="1"/>
+          </p:nvPr>
+        </p:nvPicPr>
+        <p:blipFill>
+          <a:blip r:embed="rId2">
+            <a:extLst>
+              <a:ext uri="{28A0092B-C50C-407E-A947-70E740481C1C}">
+                <a14:useLocalDpi xmlns:a14="http://schemas.microsoft.com/office/drawing/2010/main" val="0"/>
+              </a:ext>
+            </a:extLst>
+          </a:blip>
+          <a:stretch>
+            <a:fillRect/>
+          </a:stretch>
+        </p:blipFill>
+        <p:spPr>
+          <a:xfrm>
+            <a:off x="1416050" y="1931375"/>
+            <a:ext cx="9359900" cy="4000500"/>
+          </a:xfrm>
+        </p:spPr>
+      </p:pic>
+      <p:pic>
+        <p:nvPicPr>
+          <p:cNvPr id="5" name="Picture 4"/>
+          <p:cNvPicPr>
+            <a:picLocks noChangeAspect="1"/>
+          </p:cNvPicPr>
+          <p:nvPr/>
+        </p:nvPicPr>
+        <p:blipFill>
+          <a:blip r:embed="rId3">
+            <a:extLst>
+              <a:ext uri="{28A0092B-C50C-407E-A947-70E740481C1C}">
+                <a14:useLocalDpi xmlns:a14="http://schemas.microsoft.com/office/drawing/2010/main" val="0"/>
+              </a:ext>
+            </a:extLst>
+          </a:blip>
+          <a:stretch>
+            <a:fillRect/>
+          </a:stretch>
+        </p:blipFill>
+        <p:spPr>
+          <a:xfrm>
+            <a:off x="9801412" y="4624575"/>
+            <a:ext cx="1552388" cy="1552388"/>
+          </a:xfrm>
+          <a:prstGeom prst="rect">
+            <a:avLst/>
+          </a:prstGeom>
+        </p:spPr>
+      </p:pic>
+    </p:spTree>
+    <p:extLst>
+      <p:ext uri="{BB962C8B-B14F-4D97-AF65-F5344CB8AC3E}">
+        <p14:creationId xmlns:p14="http://schemas.microsoft.com/office/powerpoint/2010/main" val="955324861"/>
+      </p:ext>
+    </p:extLst>
+  </p:cSld>
+  <p:clrMapOvr>
+    <a:masterClrMapping/>
+  </p:clrMapOvr>
+  <p:timing>
+    <p:tnLst>
+      <p:par>
+        <p:cTn id="1" dur="indefinite" restart="never" nodeType="tmRoot"/>
+      </p:par>
+    </p:tnLst>
+  </p:timing>
+</p:sld>
+</file>
+
+<file path=ppt/slides/slide11.xml><?xml version="1.0" encoding="utf-8"?>
+<p:sld xmlns:a="http://schemas.openxmlformats.org/drawingml/2006/main" xmlns:r="http://schemas.openxmlformats.org/officeDocument/2006/relationships" xmlns:p="http://schemas.openxmlformats.org/presentationml/2006/main">
+  <p:cSld>
+    <p:spTree>
+      <p:nvGrpSpPr>
+        <p:cNvPr id="1" name=""/>
+        <p:cNvGrpSpPr/>
+        <p:nvPr/>
+      </p:nvGrpSpPr>
+      <p:grpSpPr>
+        <a:xfrm>
+          <a:off x="0" y="0"/>
+          <a:ext cx="0" cy="0"/>
+          <a:chOff x="0" y="0"/>
+          <a:chExt cx="0" cy="0"/>
+        </a:xfrm>
+      </p:grpSpPr>
+      <p:sp>
+        <p:nvSpPr>
+          <p:cNvPr id="2" name="Title 1"/>
+          <p:cNvSpPr>
+            <a:spLocks noGrp="1"/>
+          </p:cNvSpPr>
+          <p:nvPr>
+            <p:ph type="title"/>
+          </p:nvPr>
+        </p:nvSpPr>
         <p:spPr>
           <a:xfrm>
             <a:off x="838200" y="388851"/>
@@ -3620,8 +3832,21 @@
           <a:p>
             <a:r>
               <a:rPr lang="en-US" dirty="0" smtClean="0"/>
-              <a:t>Drop-in: Mondays, 11am in S32</a:t>
-            </a:r>
+              <a:t>Drop-in: </a:t>
+            </a:r>
+            <a:r>
+              <a:rPr lang="en-US" dirty="0" smtClean="0"/>
+              <a:t>Fridays, </a:t>
+            </a:r>
+            <a:r>
+              <a:rPr lang="en-US" dirty="0" smtClean="0"/>
+              <a:t>11am in </a:t>
+            </a:r>
+            <a:r>
+              <a:rPr lang="en-US" dirty="0" smtClean="0"/>
+              <a:t>S22</a:t>
+            </a:r>
+            <a:endParaRPr lang="en-US" dirty="0" smtClean="0"/>
           </a:p>
           <a:p>
             <a:endParaRPr lang="en-US" dirty="0" smtClean="0"/>
@@ -3691,6 +3916,13 @@
   <p:clrMapOvr>
     <a:masterClrMapping/>
   </p:clrMapOvr>
+  <p:timing>
+    <p:tnLst>
+      <p:par>
+        <p:cTn id="1" dur="indefinite" restart="never" nodeType="tmRoot"/>
+      </p:par>
+    </p:tnLst>
+  </p:timing>
 </p:sld>
 </file>
 
@@ -3809,10 +4041,108 @@
   <p:clrMapOvr>
     <a:masterClrMapping/>
   </p:clrMapOvr>
+  <p:timing>
+    <p:tnLst>
+      <p:par>
+        <p:cTn id="1" dur="indefinite" restart="never" nodeType="tmRoot"/>
+      </p:par>
+    </p:tnLst>
+  </p:timing>
 </p:sld>
 </file>
 
 <file path=ppt/slides/slide3.xml><?xml version="1.0" encoding="utf-8"?>
+<p:sld xmlns:a="http://schemas.openxmlformats.org/drawingml/2006/main" xmlns:r="http://schemas.openxmlformats.org/officeDocument/2006/relationships" xmlns:p="http://schemas.openxmlformats.org/presentationml/2006/main">
+  <p:cSld>
+    <p:spTree>
+      <p:nvGrpSpPr>
+        <p:cNvPr id="1" name=""/>
+        <p:cNvGrpSpPr/>
+        <p:nvPr/>
+      </p:nvGrpSpPr>
+      <p:grpSpPr>
+        <a:xfrm>
+          <a:off x="0" y="0"/>
+          <a:ext cx="0" cy="0"/>
+          <a:chOff x="0" y="0"/>
+          <a:chExt cx="0" cy="0"/>
+        </a:xfrm>
+      </p:grpSpPr>
+      <p:pic>
+        <p:nvPicPr>
+          <p:cNvPr id="4" name="Picture 3"/>
+          <p:cNvPicPr>
+            <a:picLocks noChangeAspect="1"/>
+          </p:cNvPicPr>
+          <p:nvPr/>
+        </p:nvPicPr>
+        <p:blipFill>
+          <a:blip r:embed="rId2"/>
+          <a:stretch>
+            <a:fillRect/>
+          </a:stretch>
+        </p:blipFill>
+        <p:spPr>
+          <a:xfrm>
+            <a:off x="1966227" y="365125"/>
+            <a:ext cx="8259546" cy="5504213"/>
+          </a:xfrm>
+          <a:prstGeom prst="rect">
+            <a:avLst/>
+          </a:prstGeom>
+        </p:spPr>
+      </p:pic>
+      <p:pic>
+        <p:nvPicPr>
+          <p:cNvPr id="5" name="Picture 4"/>
+          <p:cNvPicPr>
+            <a:picLocks noChangeAspect="1"/>
+          </p:cNvPicPr>
+          <p:nvPr/>
+        </p:nvPicPr>
+        <p:blipFill>
+          <a:blip r:embed="rId3">
+            <a:extLst>
+              <a:ext uri="{28A0092B-C50C-407E-A947-70E740481C1C}">
+                <a14:useLocalDpi xmlns:a14="http://schemas.microsoft.com/office/drawing/2010/main" val="0"/>
+              </a:ext>
+            </a:extLst>
+          </a:blip>
+          <a:stretch>
+            <a:fillRect/>
+          </a:stretch>
+        </p:blipFill>
+        <p:spPr>
+          <a:xfrm>
+            <a:off x="9801412" y="4624575"/>
+            <a:ext cx="1552388" cy="1552388"/>
+          </a:xfrm>
+          <a:prstGeom prst="rect">
+            <a:avLst/>
+          </a:prstGeom>
+        </p:spPr>
+      </p:pic>
+    </p:spTree>
+    <p:extLst>
+      <p:ext uri="{BB962C8B-B14F-4D97-AF65-F5344CB8AC3E}">
+        <p14:creationId xmlns:p14="http://schemas.microsoft.com/office/powerpoint/2010/main" val="160426542"/>
+      </p:ext>
+    </p:extLst>
+  </p:cSld>
+  <p:clrMapOvr>
+    <a:masterClrMapping/>
+  </p:clrMapOvr>
+  <p:timing>
+    <p:tnLst>
+      <p:par>
+        <p:cTn id="1" dur="indefinite" restart="never" nodeType="tmRoot"/>
+      </p:par>
+    </p:tnLst>
+  </p:timing>
+</p:sld>
+</file>
+
+<file path=ppt/slides/slide4.xml><?xml version="1.0" encoding="utf-8"?>
 <p:sld xmlns:a="http://schemas.openxmlformats.org/drawingml/2006/main" xmlns:r="http://schemas.openxmlformats.org/officeDocument/2006/relationships" xmlns:p="http://schemas.openxmlformats.org/presentationml/2006/main">
   <p:cSld>
     <p:spTree>
@@ -4012,10 +4342,17 @@
   <p:clrMapOvr>
     <a:masterClrMapping/>
   </p:clrMapOvr>
+  <p:timing>
+    <p:tnLst>
+      <p:par>
+        <p:cTn id="1" dur="indefinite" restart="never" nodeType="tmRoot"/>
+      </p:par>
+    </p:tnLst>
+  </p:timing>
 </p:sld>
 </file>
 
-<file path=ppt/slides/slide4.xml><?xml version="1.0" encoding="utf-8"?>
+<file path=ppt/slides/slide5.xml><?xml version="1.0" encoding="utf-8"?>
 <p:sld xmlns:a="http://schemas.openxmlformats.org/drawingml/2006/main" xmlns:r="http://schemas.openxmlformats.org/officeDocument/2006/relationships" xmlns:p="http://schemas.openxmlformats.org/presentationml/2006/main">
   <p:cSld>
     <p:spTree>
@@ -4152,10 +4489,17 @@
   <p:clrMapOvr>
     <a:masterClrMapping/>
   </p:clrMapOvr>
+  <p:timing>
+    <p:tnLst>
+      <p:par>
+        <p:cTn id="1" dur="indefinite" restart="never" nodeType="tmRoot"/>
+      </p:par>
+    </p:tnLst>
+  </p:timing>
 </p:sld>
 </file>
 
-<file path=ppt/slides/slide5.xml><?xml version="1.0" encoding="utf-8"?>
+<file path=ppt/slides/slide6.xml><?xml version="1.0" encoding="utf-8"?>
 <p:sld xmlns:a="http://schemas.openxmlformats.org/drawingml/2006/main" xmlns:r="http://schemas.openxmlformats.org/officeDocument/2006/relationships" xmlns:p="http://schemas.openxmlformats.org/presentationml/2006/main">
   <p:cSld>
     <p:spTree>
@@ -4253,7 +4597,7 @@
           <a:p>
             <a:r>
               <a:rPr lang="en-US" dirty="0" smtClean="0"/>
-              <a:t>restaurants-lesson.1csv </a:t>
+              <a:t>restaurants-lesson1.csv </a:t>
             </a:r>
             <a:r>
               <a:rPr lang="en-US" dirty="0"/>
@@ -4321,10 +4665,17 @@
   <p:clrMapOvr>
     <a:masterClrMapping/>
   </p:clrMapOvr>
+  <p:timing>
+    <p:tnLst>
+      <p:par>
+        <p:cTn id="1" dur="indefinite" restart="never" nodeType="tmRoot"/>
+      </p:par>
+    </p:tnLst>
+  </p:timing>
 </p:sld>
 </file>
 
-<file path=ppt/slides/slide6.xml><?xml version="1.0" encoding="utf-8"?>
+<file path=ppt/slides/slide7.xml><?xml version="1.0" encoding="utf-8"?>
 <p:sld xmlns:a="http://schemas.openxmlformats.org/drawingml/2006/main" xmlns:r="http://schemas.openxmlformats.org/officeDocument/2006/relationships" xmlns:p="http://schemas.openxmlformats.org/presentationml/2006/main">
   <p:cSld>
     <p:spTree>
@@ -4436,10 +4787,17 @@
   <p:clrMapOvr>
     <a:masterClrMapping/>
   </p:clrMapOvr>
+  <p:timing>
+    <p:tnLst>
+      <p:par>
+        <p:cTn id="1" dur="indefinite" restart="never" nodeType="tmRoot"/>
+      </p:par>
+    </p:tnLst>
+  </p:timing>
 </p:sld>
 </file>
 
-<file path=ppt/slides/slide7.xml><?xml version="1.0" encoding="utf-8"?>
+<file path=ppt/slides/slide8.xml><?xml version="1.0" encoding="utf-8"?>
 <p:sld xmlns:a="http://schemas.openxmlformats.org/drawingml/2006/main" xmlns:r="http://schemas.openxmlformats.org/officeDocument/2006/relationships" xmlns:p="http://schemas.openxmlformats.org/presentationml/2006/main">
   <p:cSld>
     <p:spTree>
@@ -4510,9 +4868,39 @@
           </a:prstGeom>
         </p:spPr>
       </p:pic>
+      <p:sp>
+        <p:nvSpPr>
+          <p:cNvPr id="6" name="TextBox 5"/>
+          <p:cNvSpPr txBox="1"/>
+          <p:nvPr/>
+        </p:nvSpPr>
+        <p:spPr>
+          <a:xfrm>
+            <a:off x="1567543" y="5625737"/>
+            <a:ext cx="4349204" cy="369332"/>
+          </a:xfrm>
+          <a:prstGeom prst="rect">
+            <a:avLst/>
+          </a:prstGeom>
+          <a:noFill/>
+        </p:spPr>
+        <p:txBody>
+          <a:bodyPr wrap="none" rtlCol="0">
+            <a:spAutoFit/>
+          </a:bodyPr>
+          <a:lstStyle/>
+          <a:p>
+            <a:r>
+              <a:rPr lang="en-US" dirty="0" smtClean="0"/>
+              <a:t>Great! But there’s still a problem. What is it?</a:t>
+            </a:r>
+            <a:endParaRPr lang="en-US" dirty="0"/>
+          </a:p>
+        </p:txBody>
+      </p:sp>
       <p:pic>
         <p:nvPicPr>
-          <p:cNvPr id="5" name="Content Placeholder 3"/>
+          <p:cNvPr id="7" name="Content Placeholder 6"/>
           <p:cNvPicPr>
             <a:picLocks noGrp="1" noChangeAspect="1"/>
           </p:cNvPicPr>
@@ -4534,41 +4922,11 @@
         </p:blipFill>
         <p:spPr>
           <a:xfrm>
-            <a:off x="2443262" y="2134159"/>
-            <a:ext cx="7305476" cy="2046945"/>
+            <a:off x="1727200" y="2109881"/>
+            <a:ext cx="8737600" cy="2095500"/>
           </a:xfrm>
         </p:spPr>
       </p:pic>
-      <p:sp>
-        <p:nvSpPr>
-          <p:cNvPr id="6" name="TextBox 5"/>
-          <p:cNvSpPr txBox="1"/>
-          <p:nvPr/>
-        </p:nvSpPr>
-        <p:spPr>
-          <a:xfrm>
-            <a:off x="1567543" y="5625737"/>
-            <a:ext cx="4349204" cy="369332"/>
-          </a:xfrm>
-          <a:prstGeom prst="rect">
-            <a:avLst/>
-          </a:prstGeom>
-          <a:noFill/>
-        </p:spPr>
-        <p:txBody>
-          <a:bodyPr wrap="none" rtlCol="0">
-            <a:spAutoFit/>
-          </a:bodyPr>
-          <a:lstStyle/>
-          <a:p>
-            <a:r>
-              <a:rPr lang="en-US" dirty="0" smtClean="0"/>
-              <a:t>Great! But there’s still a problem. What is it?</a:t>
-            </a:r>
-            <a:endParaRPr lang="en-US" dirty="0"/>
-          </a:p>
-        </p:txBody>
-      </p:sp>
     </p:spTree>
     <p:extLst>
       <p:ext uri="{BB962C8B-B14F-4D97-AF65-F5344CB8AC3E}">
@@ -4579,10 +4937,17 @@
   <p:clrMapOvr>
     <a:masterClrMapping/>
   </p:clrMapOvr>
+  <p:timing>
+    <p:tnLst>
+      <p:par>
+        <p:cTn id="1" dur="indefinite" restart="never" nodeType="tmRoot"/>
+      </p:par>
+    </p:tnLst>
+  </p:timing>
 </p:sld>
 </file>
 
-<file path=ppt/slides/slide8.xml><?xml version="1.0" encoding="utf-8"?>
+<file path=ppt/slides/slide9.xml><?xml version="1.0" encoding="utf-8"?>
 <p:sld xmlns:a="http://schemas.openxmlformats.org/drawingml/2006/main" xmlns:r="http://schemas.openxmlformats.org/officeDocument/2006/relationships" xmlns:p="http://schemas.openxmlformats.org/presentationml/2006/main">
   <p:cSld>
     <p:spTree>
@@ -4751,119 +5116,13 @@
   <p:clrMapOvr>
     <a:masterClrMapping/>
   </p:clrMapOvr>
-</p:sld>
-</file>
-
-<file path=ppt/slides/slide9.xml><?xml version="1.0" encoding="utf-8"?>
-<p:sld xmlns:a="http://schemas.openxmlformats.org/drawingml/2006/main" xmlns:r="http://schemas.openxmlformats.org/officeDocument/2006/relationships" xmlns:p="http://schemas.openxmlformats.org/presentationml/2006/main">
-  <p:cSld>
-    <p:spTree>
-      <p:nvGrpSpPr>
-        <p:cNvPr id="1" name=""/>
-        <p:cNvGrpSpPr/>
-        <p:nvPr/>
-      </p:nvGrpSpPr>
-      <p:grpSpPr>
-        <a:xfrm>
-          <a:off x="0" y="0"/>
-          <a:ext cx="0" cy="0"/>
-          <a:chOff x="0" y="0"/>
-          <a:chExt cx="0" cy="0"/>
-        </a:xfrm>
-      </p:grpSpPr>
-      <p:sp>
-        <p:nvSpPr>
-          <p:cNvPr id="2" name="Title 1"/>
-          <p:cNvSpPr>
-            <a:spLocks noGrp="1"/>
-          </p:cNvSpPr>
-          <p:nvPr>
-            <p:ph type="title"/>
-          </p:nvPr>
-        </p:nvSpPr>
-        <p:spPr/>
-        <p:txBody>
-          <a:bodyPr/>
-          <a:lstStyle/>
-          <a:p>
-            <a:pPr algn="ctr"/>
-            <a:r>
-              <a:rPr lang="en-US" dirty="0" smtClean="0"/>
-              <a:t>What does this do?</a:t>
-            </a:r>
-            <a:endParaRPr lang="en-US" dirty="0"/>
-          </a:p>
-        </p:txBody>
-      </p:sp>
-      <p:pic>
-        <p:nvPicPr>
-          <p:cNvPr id="8" name="Content Placeholder 7"/>
-          <p:cNvPicPr>
-            <a:picLocks noGrp="1" noChangeAspect="1"/>
-          </p:cNvPicPr>
-          <p:nvPr>
-            <p:ph idx="1"/>
-          </p:nvPr>
-        </p:nvPicPr>
-        <p:blipFill>
-          <a:blip r:embed="rId2">
-            <a:extLst>
-              <a:ext uri="{28A0092B-C50C-407E-A947-70E740481C1C}">
-                <a14:useLocalDpi xmlns:a14="http://schemas.microsoft.com/office/drawing/2010/main" val="0"/>
-              </a:ext>
-            </a:extLst>
-          </a:blip>
-          <a:stretch>
-            <a:fillRect/>
-          </a:stretch>
-        </p:blipFill>
-        <p:spPr>
-          <a:xfrm>
-            <a:off x="1416050" y="1931375"/>
-            <a:ext cx="9359900" cy="4000500"/>
-          </a:xfrm>
-        </p:spPr>
-      </p:pic>
-      <p:pic>
-        <p:nvPicPr>
-          <p:cNvPr id="5" name="Picture 4"/>
-          <p:cNvPicPr>
-            <a:picLocks noChangeAspect="1"/>
-          </p:cNvPicPr>
-          <p:nvPr/>
-        </p:nvPicPr>
-        <p:blipFill>
-          <a:blip r:embed="rId3">
-            <a:extLst>
-              <a:ext uri="{28A0092B-C50C-407E-A947-70E740481C1C}">
-                <a14:useLocalDpi xmlns:a14="http://schemas.microsoft.com/office/drawing/2010/main" val="0"/>
-              </a:ext>
-            </a:extLst>
-          </a:blip>
-          <a:stretch>
-            <a:fillRect/>
-          </a:stretch>
-        </p:blipFill>
-        <p:spPr>
-          <a:xfrm>
-            <a:off x="9801412" y="4624575"/>
-            <a:ext cx="1552388" cy="1552388"/>
-          </a:xfrm>
-          <a:prstGeom prst="rect">
-            <a:avLst/>
-          </a:prstGeom>
-        </p:spPr>
-      </p:pic>
-    </p:spTree>
-    <p:extLst>
-      <p:ext uri="{BB962C8B-B14F-4D97-AF65-F5344CB8AC3E}">
-        <p14:creationId xmlns:p14="http://schemas.microsoft.com/office/powerpoint/2010/main" val="955324861"/>
-      </p:ext>
-    </p:extLst>
-  </p:cSld>
-  <p:clrMapOvr>
-    <a:masterClrMapping/>
-  </p:clrMapOvr>
+  <p:timing>
+    <p:tnLst>
+      <p:par>
+        <p:cTn id="1" dur="indefinite" restart="never" nodeType="tmRoot"/>
+      </p:par>
+    </p:tnLst>
+  </p:timing>
 </p:sld>
 </file>
 

</xml_diff>

<commit_message>
At long last: Python 3 example code
</commit_message>
<xml_diff>
--- a/Python Level 2/Lesson 1/Session 1.pptx
+++ b/Python Level 2/Lesson 1/Session 1.pptx
@@ -207,7 +207,7 @@
           <a:p>
             <a:fld id="{E700A533-32BB-7A4E-AE6B-F0A2BE39E8B0}" type="datetimeFigureOut">
               <a:rPr lang="en-US" smtClean="0"/>
-              <a:t>9/19/17</a:t>
+              <a:t>5/16/18</a:t>
             </a:fld>
             <a:endParaRPr lang="en-US"/>
           </a:p>
@@ -271,38 +271,37 @@
           <a:p>
             <a:pPr lvl="0"/>
             <a:r>
-              <a:rPr lang="en-US" smtClean="0"/>
+              <a:rPr lang="en-US"/>
               <a:t>Click to edit Master text styles</a:t>
             </a:r>
           </a:p>
           <a:p>
             <a:pPr lvl="1"/>
             <a:r>
-              <a:rPr lang="en-US" smtClean="0"/>
+              <a:rPr lang="en-US"/>
               <a:t>Second level</a:t>
             </a:r>
           </a:p>
           <a:p>
             <a:pPr lvl="2"/>
             <a:r>
-              <a:rPr lang="en-US" smtClean="0"/>
+              <a:rPr lang="en-US"/>
               <a:t>Third level</a:t>
             </a:r>
           </a:p>
           <a:p>
             <a:pPr lvl="3"/>
             <a:r>
-              <a:rPr lang="en-US" smtClean="0"/>
+              <a:rPr lang="en-US"/>
               <a:t>Fourth level</a:t>
             </a:r>
           </a:p>
           <a:p>
             <a:pPr lvl="4"/>
             <a:r>
-              <a:rPr lang="en-US" smtClean="0"/>
+              <a:rPr lang="en-US"/>
               <a:t>Fifth level</a:t>
             </a:r>
-            <a:endParaRPr lang="en-US"/>
           </a:p>
         </p:txBody>
       </p:sp>
@@ -604,11 +603,11 @@
           <a:lstStyle/>
           <a:p>
             <a:r>
-              <a:rPr lang="en-US" dirty="0" smtClean="0"/>
+              <a:rPr lang="en-US" dirty="0"/>
               <a:t>Extra credit: what</a:t>
             </a:r>
             <a:r>
-              <a:rPr lang="en-US" baseline="0" dirty="0" smtClean="0"/>
+              <a:rPr lang="en-US" baseline="0" dirty="0"/>
               <a:t> happens if there’s no data file when we run our program? How can we change the code so that isn’t a problem?</a:t>
             </a:r>
             <a:endParaRPr lang="en-US" dirty="0"/>
@@ -693,10 +692,9 @@
           </a:lstStyle>
           <a:p>
             <a:r>
-              <a:rPr lang="en-US" smtClean="0"/>
+              <a:rPr lang="en-US"/>
               <a:t>Click to edit Master title style</a:t>
             </a:r>
-            <a:endParaRPr lang="en-US"/>
           </a:p>
         </p:txBody>
       </p:sp>
@@ -758,10 +756,9 @@
           </a:lstStyle>
           <a:p>
             <a:r>
-              <a:rPr lang="en-US" smtClean="0"/>
+              <a:rPr lang="en-US"/>
               <a:t>Click to edit Master subtitle style</a:t>
             </a:r>
-            <a:endParaRPr lang="en-US"/>
           </a:p>
         </p:txBody>
       </p:sp>
@@ -782,7 +779,7 @@
           <a:p>
             <a:fld id="{F86DE704-5A85-4041-9FC6-7273780BCBF6}" type="datetimeFigureOut">
               <a:rPr lang="en-US" smtClean="0"/>
-              <a:t>9/19/17</a:t>
+              <a:t>5/16/18</a:t>
             </a:fld>
             <a:endParaRPr lang="en-US"/>
           </a:p>
@@ -876,10 +873,9 @@
           <a:lstStyle/>
           <a:p>
             <a:r>
-              <a:rPr lang="en-US" smtClean="0"/>
+              <a:rPr lang="en-US"/>
               <a:t>Click to edit Master title style</a:t>
             </a:r>
-            <a:endParaRPr lang="en-US"/>
           </a:p>
         </p:txBody>
       </p:sp>
@@ -900,38 +896,37 @@
           <a:p>
             <a:pPr lvl="0"/>
             <a:r>
-              <a:rPr lang="en-US" smtClean="0"/>
+              <a:rPr lang="en-US"/>
               <a:t>Click to edit Master text styles</a:t>
             </a:r>
           </a:p>
           <a:p>
             <a:pPr lvl="1"/>
             <a:r>
-              <a:rPr lang="en-US" smtClean="0"/>
+              <a:rPr lang="en-US"/>
               <a:t>Second level</a:t>
             </a:r>
           </a:p>
           <a:p>
             <a:pPr lvl="2"/>
             <a:r>
-              <a:rPr lang="en-US" smtClean="0"/>
+              <a:rPr lang="en-US"/>
               <a:t>Third level</a:t>
             </a:r>
           </a:p>
           <a:p>
             <a:pPr lvl="3"/>
             <a:r>
-              <a:rPr lang="en-US" smtClean="0"/>
+              <a:rPr lang="en-US"/>
               <a:t>Fourth level</a:t>
             </a:r>
           </a:p>
           <a:p>
             <a:pPr lvl="4"/>
             <a:r>
-              <a:rPr lang="en-US" smtClean="0"/>
+              <a:rPr lang="en-US"/>
               <a:t>Fifth level</a:t>
             </a:r>
-            <a:endParaRPr lang="en-US"/>
           </a:p>
         </p:txBody>
       </p:sp>
@@ -952,7 +947,7 @@
           <a:p>
             <a:fld id="{F86DE704-5A85-4041-9FC6-7273780BCBF6}" type="datetimeFigureOut">
               <a:rPr lang="en-US" smtClean="0"/>
-              <a:t>9/19/17</a:t>
+              <a:t>5/16/18</a:t>
             </a:fld>
             <a:endParaRPr lang="en-US"/>
           </a:p>
@@ -1051,10 +1046,9 @@
           <a:lstStyle/>
           <a:p>
             <a:r>
-              <a:rPr lang="en-US" smtClean="0"/>
+              <a:rPr lang="en-US"/>
               <a:t>Click to edit Master title style</a:t>
             </a:r>
-            <a:endParaRPr lang="en-US"/>
           </a:p>
         </p:txBody>
       </p:sp>
@@ -1080,38 +1074,37 @@
           <a:p>
             <a:pPr lvl="0"/>
             <a:r>
-              <a:rPr lang="en-US" smtClean="0"/>
+              <a:rPr lang="en-US"/>
               <a:t>Click to edit Master text styles</a:t>
             </a:r>
           </a:p>
           <a:p>
             <a:pPr lvl="1"/>
             <a:r>
-              <a:rPr lang="en-US" smtClean="0"/>
+              <a:rPr lang="en-US"/>
               <a:t>Second level</a:t>
             </a:r>
           </a:p>
           <a:p>
             <a:pPr lvl="2"/>
             <a:r>
-              <a:rPr lang="en-US" smtClean="0"/>
+              <a:rPr lang="en-US"/>
               <a:t>Third level</a:t>
             </a:r>
           </a:p>
           <a:p>
             <a:pPr lvl="3"/>
             <a:r>
-              <a:rPr lang="en-US" smtClean="0"/>
+              <a:rPr lang="en-US"/>
               <a:t>Fourth level</a:t>
             </a:r>
           </a:p>
           <a:p>
             <a:pPr lvl="4"/>
             <a:r>
-              <a:rPr lang="en-US" smtClean="0"/>
+              <a:rPr lang="en-US"/>
               <a:t>Fifth level</a:t>
             </a:r>
-            <a:endParaRPr lang="en-US"/>
           </a:p>
         </p:txBody>
       </p:sp>
@@ -1132,7 +1125,7 @@
           <a:p>
             <a:fld id="{F86DE704-5A85-4041-9FC6-7273780BCBF6}" type="datetimeFigureOut">
               <a:rPr lang="en-US" smtClean="0"/>
-              <a:t>9/19/17</a:t>
+              <a:t>5/16/18</a:t>
             </a:fld>
             <a:endParaRPr lang="en-US"/>
           </a:p>
@@ -1226,10 +1219,9 @@
           <a:lstStyle/>
           <a:p>
             <a:r>
-              <a:rPr lang="en-US" smtClean="0"/>
+              <a:rPr lang="en-US"/>
               <a:t>Click to edit Master title style</a:t>
             </a:r>
-            <a:endParaRPr lang="en-US"/>
           </a:p>
         </p:txBody>
       </p:sp>
@@ -1250,38 +1242,37 @@
           <a:p>
             <a:pPr lvl="0"/>
             <a:r>
-              <a:rPr lang="en-US" smtClean="0"/>
+              <a:rPr lang="en-US"/>
               <a:t>Click to edit Master text styles</a:t>
             </a:r>
           </a:p>
           <a:p>
             <a:pPr lvl="1"/>
             <a:r>
-              <a:rPr lang="en-US" smtClean="0"/>
+              <a:rPr lang="en-US"/>
               <a:t>Second level</a:t>
             </a:r>
           </a:p>
           <a:p>
             <a:pPr lvl="2"/>
             <a:r>
-              <a:rPr lang="en-US" smtClean="0"/>
+              <a:rPr lang="en-US"/>
               <a:t>Third level</a:t>
             </a:r>
           </a:p>
           <a:p>
             <a:pPr lvl="3"/>
             <a:r>
-              <a:rPr lang="en-US" smtClean="0"/>
+              <a:rPr lang="en-US"/>
               <a:t>Fourth level</a:t>
             </a:r>
           </a:p>
           <a:p>
             <a:pPr lvl="4"/>
             <a:r>
-              <a:rPr lang="en-US" smtClean="0"/>
+              <a:rPr lang="en-US"/>
               <a:t>Fifth level</a:t>
             </a:r>
-            <a:endParaRPr lang="en-US"/>
           </a:p>
         </p:txBody>
       </p:sp>
@@ -1302,7 +1293,7 @@
           <a:p>
             <a:fld id="{F86DE704-5A85-4041-9FC6-7273780BCBF6}" type="datetimeFigureOut">
               <a:rPr lang="en-US" smtClean="0"/>
-              <a:t>9/19/17</a:t>
+              <a:t>5/16/18</a:t>
             </a:fld>
             <a:endParaRPr lang="en-US"/>
           </a:p>
@@ -1405,10 +1396,9 @@
           </a:lstStyle>
           <a:p>
             <a:r>
-              <a:rPr lang="en-US" smtClean="0"/>
+              <a:rPr lang="en-US"/>
               <a:t>Click to edit Master title style</a:t>
             </a:r>
-            <a:endParaRPr lang="en-US"/>
           </a:p>
         </p:txBody>
       </p:sp>
@@ -1525,7 +1515,7 @@
           <a:p>
             <a:pPr lvl="0"/>
             <a:r>
-              <a:rPr lang="en-US" smtClean="0"/>
+              <a:rPr lang="en-US"/>
               <a:t>Click to edit Master text styles</a:t>
             </a:r>
           </a:p>
@@ -1548,7 +1538,7 @@
           <a:p>
             <a:fld id="{F86DE704-5A85-4041-9FC6-7273780BCBF6}" type="datetimeFigureOut">
               <a:rPr lang="en-US" smtClean="0"/>
-              <a:t>9/19/17</a:t>
+              <a:t>5/16/18</a:t>
             </a:fld>
             <a:endParaRPr lang="en-US"/>
           </a:p>
@@ -1642,10 +1632,9 @@
           <a:lstStyle/>
           <a:p>
             <a:r>
-              <a:rPr lang="en-US" smtClean="0"/>
+              <a:rPr lang="en-US"/>
               <a:t>Click to edit Master title style</a:t>
             </a:r>
-            <a:endParaRPr lang="en-US"/>
           </a:p>
         </p:txBody>
       </p:sp>
@@ -1671,38 +1660,37 @@
           <a:p>
             <a:pPr lvl="0"/>
             <a:r>
-              <a:rPr lang="en-US" smtClean="0"/>
+              <a:rPr lang="en-US"/>
               <a:t>Click to edit Master text styles</a:t>
             </a:r>
           </a:p>
           <a:p>
             <a:pPr lvl="1"/>
             <a:r>
-              <a:rPr lang="en-US" smtClean="0"/>
+              <a:rPr lang="en-US"/>
               <a:t>Second level</a:t>
             </a:r>
           </a:p>
           <a:p>
             <a:pPr lvl="2"/>
             <a:r>
-              <a:rPr lang="en-US" smtClean="0"/>
+              <a:rPr lang="en-US"/>
               <a:t>Third level</a:t>
             </a:r>
           </a:p>
           <a:p>
             <a:pPr lvl="3"/>
             <a:r>
-              <a:rPr lang="en-US" smtClean="0"/>
+              <a:rPr lang="en-US"/>
               <a:t>Fourth level</a:t>
             </a:r>
           </a:p>
           <a:p>
             <a:pPr lvl="4"/>
             <a:r>
-              <a:rPr lang="en-US" smtClean="0"/>
+              <a:rPr lang="en-US"/>
               <a:t>Fifth level</a:t>
             </a:r>
-            <a:endParaRPr lang="en-US"/>
           </a:p>
         </p:txBody>
       </p:sp>
@@ -1728,38 +1716,37 @@
           <a:p>
             <a:pPr lvl="0"/>
             <a:r>
-              <a:rPr lang="en-US" smtClean="0"/>
+              <a:rPr lang="en-US"/>
               <a:t>Click to edit Master text styles</a:t>
             </a:r>
           </a:p>
           <a:p>
             <a:pPr lvl="1"/>
             <a:r>
-              <a:rPr lang="en-US" smtClean="0"/>
+              <a:rPr lang="en-US"/>
               <a:t>Second level</a:t>
             </a:r>
           </a:p>
           <a:p>
             <a:pPr lvl="2"/>
             <a:r>
-              <a:rPr lang="en-US" smtClean="0"/>
+              <a:rPr lang="en-US"/>
               <a:t>Third level</a:t>
             </a:r>
           </a:p>
           <a:p>
             <a:pPr lvl="3"/>
             <a:r>
-              <a:rPr lang="en-US" smtClean="0"/>
+              <a:rPr lang="en-US"/>
               <a:t>Fourth level</a:t>
             </a:r>
           </a:p>
           <a:p>
             <a:pPr lvl="4"/>
             <a:r>
-              <a:rPr lang="en-US" smtClean="0"/>
+              <a:rPr lang="en-US"/>
               <a:t>Fifth level</a:t>
             </a:r>
-            <a:endParaRPr lang="en-US"/>
           </a:p>
         </p:txBody>
       </p:sp>
@@ -1780,7 +1767,7 @@
           <a:p>
             <a:fld id="{F86DE704-5A85-4041-9FC6-7273780BCBF6}" type="datetimeFigureOut">
               <a:rPr lang="en-US" smtClean="0"/>
-              <a:t>9/19/17</a:t>
+              <a:t>5/16/18</a:t>
             </a:fld>
             <a:endParaRPr lang="en-US"/>
           </a:p>
@@ -1879,10 +1866,9 @@
           <a:lstStyle/>
           <a:p>
             <a:r>
-              <a:rPr lang="en-US" smtClean="0"/>
+              <a:rPr lang="en-US"/>
               <a:t>Click to edit Master title style</a:t>
             </a:r>
-            <a:endParaRPr lang="en-US"/>
           </a:p>
         </p:txBody>
       </p:sp>
@@ -1945,7 +1931,7 @@
           <a:p>
             <a:pPr lvl="0"/>
             <a:r>
-              <a:rPr lang="en-US" smtClean="0"/>
+              <a:rPr lang="en-US"/>
               <a:t>Click to edit Master text styles</a:t>
             </a:r>
           </a:p>
@@ -1973,38 +1959,37 @@
           <a:p>
             <a:pPr lvl="0"/>
             <a:r>
-              <a:rPr lang="en-US" smtClean="0"/>
+              <a:rPr lang="en-US"/>
               <a:t>Click to edit Master text styles</a:t>
             </a:r>
           </a:p>
           <a:p>
             <a:pPr lvl="1"/>
             <a:r>
-              <a:rPr lang="en-US" smtClean="0"/>
+              <a:rPr lang="en-US"/>
               <a:t>Second level</a:t>
             </a:r>
           </a:p>
           <a:p>
             <a:pPr lvl="2"/>
             <a:r>
-              <a:rPr lang="en-US" smtClean="0"/>
+              <a:rPr lang="en-US"/>
               <a:t>Third level</a:t>
             </a:r>
           </a:p>
           <a:p>
             <a:pPr lvl="3"/>
             <a:r>
-              <a:rPr lang="en-US" smtClean="0"/>
+              <a:rPr lang="en-US"/>
               <a:t>Fourth level</a:t>
             </a:r>
           </a:p>
           <a:p>
             <a:pPr lvl="4"/>
             <a:r>
-              <a:rPr lang="en-US" smtClean="0"/>
+              <a:rPr lang="en-US"/>
               <a:t>Fifth level</a:t>
             </a:r>
-            <a:endParaRPr lang="en-US"/>
           </a:p>
         </p:txBody>
       </p:sp>
@@ -2067,7 +2052,7 @@
           <a:p>
             <a:pPr lvl="0"/>
             <a:r>
-              <a:rPr lang="en-US" smtClean="0"/>
+              <a:rPr lang="en-US"/>
               <a:t>Click to edit Master text styles</a:t>
             </a:r>
           </a:p>
@@ -2095,38 +2080,37 @@
           <a:p>
             <a:pPr lvl="0"/>
             <a:r>
-              <a:rPr lang="en-US" smtClean="0"/>
+              <a:rPr lang="en-US"/>
               <a:t>Click to edit Master text styles</a:t>
             </a:r>
           </a:p>
           <a:p>
             <a:pPr lvl="1"/>
             <a:r>
-              <a:rPr lang="en-US" smtClean="0"/>
+              <a:rPr lang="en-US"/>
               <a:t>Second level</a:t>
             </a:r>
           </a:p>
           <a:p>
             <a:pPr lvl="2"/>
             <a:r>
-              <a:rPr lang="en-US" smtClean="0"/>
+              <a:rPr lang="en-US"/>
               <a:t>Third level</a:t>
             </a:r>
           </a:p>
           <a:p>
             <a:pPr lvl="3"/>
             <a:r>
-              <a:rPr lang="en-US" smtClean="0"/>
+              <a:rPr lang="en-US"/>
               <a:t>Fourth level</a:t>
             </a:r>
           </a:p>
           <a:p>
             <a:pPr lvl="4"/>
             <a:r>
-              <a:rPr lang="en-US" smtClean="0"/>
+              <a:rPr lang="en-US"/>
               <a:t>Fifth level</a:t>
             </a:r>
-            <a:endParaRPr lang="en-US"/>
           </a:p>
         </p:txBody>
       </p:sp>
@@ -2147,7 +2131,7 @@
           <a:p>
             <a:fld id="{F86DE704-5A85-4041-9FC6-7273780BCBF6}" type="datetimeFigureOut">
               <a:rPr lang="en-US" smtClean="0"/>
-              <a:t>9/19/17</a:t>
+              <a:t>5/16/18</a:t>
             </a:fld>
             <a:endParaRPr lang="en-US"/>
           </a:p>
@@ -2241,10 +2225,9 @@
           <a:lstStyle/>
           <a:p>
             <a:r>
-              <a:rPr lang="en-US" smtClean="0"/>
+              <a:rPr lang="en-US"/>
               <a:t>Click to edit Master title style</a:t>
             </a:r>
-            <a:endParaRPr lang="en-US"/>
           </a:p>
         </p:txBody>
       </p:sp>
@@ -2265,7 +2248,7 @@
           <a:p>
             <a:fld id="{F86DE704-5A85-4041-9FC6-7273780BCBF6}" type="datetimeFigureOut">
               <a:rPr lang="en-US" smtClean="0"/>
-              <a:t>9/19/17</a:t>
+              <a:t>5/16/18</a:t>
             </a:fld>
             <a:endParaRPr lang="en-US"/>
           </a:p>
@@ -2360,7 +2343,7 @@
           <a:p>
             <a:fld id="{F86DE704-5A85-4041-9FC6-7273780BCBF6}" type="datetimeFigureOut">
               <a:rPr lang="en-US" smtClean="0"/>
-              <a:t>9/19/17</a:t>
+              <a:t>5/16/18</a:t>
             </a:fld>
             <a:endParaRPr lang="en-US"/>
           </a:p>
@@ -2463,10 +2446,9 @@
           </a:lstStyle>
           <a:p>
             <a:r>
-              <a:rPr lang="en-US" smtClean="0"/>
+              <a:rPr lang="en-US"/>
               <a:t>Click to edit Master title style</a:t>
             </a:r>
-            <a:endParaRPr lang="en-US"/>
           </a:p>
         </p:txBody>
       </p:sp>
@@ -2520,38 +2502,37 @@
           <a:p>
             <a:pPr lvl="0"/>
             <a:r>
-              <a:rPr lang="en-US" smtClean="0"/>
+              <a:rPr lang="en-US"/>
               <a:t>Click to edit Master text styles</a:t>
             </a:r>
           </a:p>
           <a:p>
             <a:pPr lvl="1"/>
             <a:r>
-              <a:rPr lang="en-US" smtClean="0"/>
+              <a:rPr lang="en-US"/>
               <a:t>Second level</a:t>
             </a:r>
           </a:p>
           <a:p>
             <a:pPr lvl="2"/>
             <a:r>
-              <a:rPr lang="en-US" smtClean="0"/>
+              <a:rPr lang="en-US"/>
               <a:t>Third level</a:t>
             </a:r>
           </a:p>
           <a:p>
             <a:pPr lvl="3"/>
             <a:r>
-              <a:rPr lang="en-US" smtClean="0"/>
+              <a:rPr lang="en-US"/>
               <a:t>Fourth level</a:t>
             </a:r>
           </a:p>
           <a:p>
             <a:pPr lvl="4"/>
             <a:r>
-              <a:rPr lang="en-US" smtClean="0"/>
+              <a:rPr lang="en-US"/>
               <a:t>Fifth level</a:t>
             </a:r>
-            <a:endParaRPr lang="en-US"/>
           </a:p>
         </p:txBody>
       </p:sp>
@@ -2614,7 +2595,7 @@
           <a:p>
             <a:pPr lvl="0"/>
             <a:r>
-              <a:rPr lang="en-US" smtClean="0"/>
+              <a:rPr lang="en-US"/>
               <a:t>Click to edit Master text styles</a:t>
             </a:r>
           </a:p>
@@ -2637,7 +2618,7 @@
           <a:p>
             <a:fld id="{F86DE704-5A85-4041-9FC6-7273780BCBF6}" type="datetimeFigureOut">
               <a:rPr lang="en-US" smtClean="0"/>
-              <a:t>9/19/17</a:t>
+              <a:t>5/16/18</a:t>
             </a:fld>
             <a:endParaRPr lang="en-US"/>
           </a:p>
@@ -2740,10 +2721,9 @@
           </a:lstStyle>
           <a:p>
             <a:r>
-              <a:rPr lang="en-US" smtClean="0"/>
+              <a:rPr lang="en-US"/>
               <a:t>Click to edit Master title style</a:t>
             </a:r>
-            <a:endParaRPr lang="en-US"/>
           </a:p>
         </p:txBody>
       </p:sp>
@@ -2867,7 +2847,7 @@
           <a:p>
             <a:pPr lvl="0"/>
             <a:r>
-              <a:rPr lang="en-US" smtClean="0"/>
+              <a:rPr lang="en-US"/>
               <a:t>Click to edit Master text styles</a:t>
             </a:r>
           </a:p>
@@ -2890,7 +2870,7 @@
           <a:p>
             <a:fld id="{F86DE704-5A85-4041-9FC6-7273780BCBF6}" type="datetimeFigureOut">
               <a:rPr lang="en-US" smtClean="0"/>
-              <a:t>9/19/17</a:t>
+              <a:t>5/16/18</a:t>
             </a:fld>
             <a:endParaRPr lang="en-US"/>
           </a:p>
@@ -2999,10 +2979,9 @@
           <a:lstStyle/>
           <a:p>
             <a:r>
-              <a:rPr lang="en-US" smtClean="0"/>
+              <a:rPr lang="en-US"/>
               <a:t>Click to edit Master title style</a:t>
             </a:r>
-            <a:endParaRPr lang="en-US"/>
           </a:p>
         </p:txBody>
       </p:sp>
@@ -3033,38 +3012,37 @@
           <a:p>
             <a:pPr lvl="0"/>
             <a:r>
-              <a:rPr lang="en-US" smtClean="0"/>
+              <a:rPr lang="en-US"/>
               <a:t>Click to edit Master text styles</a:t>
             </a:r>
           </a:p>
           <a:p>
             <a:pPr lvl="1"/>
             <a:r>
-              <a:rPr lang="en-US" smtClean="0"/>
+              <a:rPr lang="en-US"/>
               <a:t>Second level</a:t>
             </a:r>
           </a:p>
           <a:p>
             <a:pPr lvl="2"/>
             <a:r>
-              <a:rPr lang="en-US" smtClean="0"/>
+              <a:rPr lang="en-US"/>
               <a:t>Third level</a:t>
             </a:r>
           </a:p>
           <a:p>
             <a:pPr lvl="3"/>
             <a:r>
-              <a:rPr lang="en-US" smtClean="0"/>
+              <a:rPr lang="en-US"/>
               <a:t>Fourth level</a:t>
             </a:r>
           </a:p>
           <a:p>
             <a:pPr lvl="4"/>
             <a:r>
-              <a:rPr lang="en-US" smtClean="0"/>
+              <a:rPr lang="en-US"/>
               <a:t>Fifth level</a:t>
             </a:r>
-            <a:endParaRPr lang="en-US"/>
           </a:p>
         </p:txBody>
       </p:sp>
@@ -3103,7 +3081,7 @@
           <a:p>
             <a:fld id="{F86DE704-5A85-4041-9FC6-7273780BCBF6}" type="datetimeFigureOut">
               <a:rPr lang="en-US" smtClean="0"/>
-              <a:t>9/19/17</a:t>
+              <a:t>5/16/18</a:t>
             </a:fld>
             <a:endParaRPr lang="en-US"/>
           </a:p>
@@ -3561,10 +3539,9 @@
           <a:lstStyle/>
           <a:p>
             <a:r>
-              <a:rPr lang="en-US" sz="4000" dirty="0" smtClean="0"/>
+              <a:rPr lang="en-US" sz="4000" dirty="0"/>
               <a:t>Python: Level 2</a:t>
             </a:r>
-            <a:endParaRPr lang="en-US" sz="4000" dirty="0"/>
           </a:p>
         </p:txBody>
       </p:sp>
@@ -3592,10 +3569,9 @@
           <a:p>
             <a:pPr algn="ctr"/>
             <a:r>
-              <a:rPr lang="en-US" sz="2800" dirty="0" smtClean="0"/>
+              <a:rPr lang="en-US" sz="2800" dirty="0"/>
               <a:t>Session 1: Welcome (back). </a:t>
             </a:r>
-            <a:endParaRPr lang="en-US" sz="2800" dirty="0"/>
           </a:p>
         </p:txBody>
       </p:sp>
@@ -3609,13 +3585,6 @@
   <p:clrMapOvr>
     <a:masterClrMapping/>
   </p:clrMapOvr>
-  <p:timing>
-    <p:tnLst>
-      <p:par>
-        <p:cTn id="1" dur="indefinite" restart="never" nodeType="tmRoot"/>
-      </p:par>
-    </p:tnLst>
-  </p:timing>
 </p:sld>
 </file>
 
@@ -3653,10 +3622,9 @@
           <a:p>
             <a:pPr algn="ctr"/>
             <a:r>
-              <a:rPr lang="en-US" dirty="0" smtClean="0"/>
+              <a:rPr lang="en-US" dirty="0"/>
               <a:t>What does this do?</a:t>
             </a:r>
-            <a:endParaRPr lang="en-US" dirty="0"/>
           </a:p>
         </p:txBody>
       </p:sp>
@@ -3729,13 +3697,6 @@
   <p:clrMapOvr>
     <a:masterClrMapping/>
   </p:clrMapOvr>
-  <p:timing>
-    <p:tnLst>
-      <p:par>
-        <p:cTn id="1" dur="indefinite" restart="never" nodeType="tmRoot"/>
-      </p:par>
-    </p:tnLst>
-  </p:timing>
 </p:sld>
 </file>
 
@@ -3778,10 +3739,9 @@
           <a:p>
             <a:pPr algn="ctr"/>
             <a:r>
-              <a:rPr lang="en-US" dirty="0" smtClean="0"/>
+              <a:rPr lang="en-US" dirty="0"/>
               <a:t>Exercise / Next week’s Class</a:t>
             </a:r>
-            <a:endParaRPr lang="en-US" dirty="0"/>
           </a:p>
         </p:txBody>
       </p:sp>
@@ -3802,27 +3762,27 @@
           </a:bodyPr>
           <a:lstStyle/>
           <a:p>
-            <a:endParaRPr lang="en-US" dirty="0" smtClean="0"/>
-          </a:p>
-          <a:p>
-            <a:r>
-              <a:rPr lang="en-US" dirty="0" smtClean="0"/>
+            <a:endParaRPr lang="en-US" dirty="0"/>
+          </a:p>
+          <a:p>
+            <a:r>
+              <a:rPr lang="en-US" dirty="0"/>
               <a:t>Can you add input validation? </a:t>
             </a:r>
           </a:p>
           <a:p>
             <a:pPr lvl="1"/>
             <a:r>
-              <a:rPr lang="en-US" dirty="0" smtClean="0"/>
+              <a:rPr lang="en-US" dirty="0"/>
               <a:t>If I enter something that isn’t a number, print an error and ask again.</a:t>
             </a:r>
           </a:p>
           <a:p>
-            <a:endParaRPr lang="en-US" dirty="0" smtClean="0"/>
-          </a:p>
-          <a:p>
-            <a:r>
-              <a:rPr lang="en-US" dirty="0" smtClean="0"/>
+            <a:endParaRPr lang="en-US" dirty="0"/>
+          </a:p>
+          <a:p>
+            <a:r>
+              <a:rPr lang="en-US" dirty="0"/>
               <a:t>Next week: Building a library, no Dewey Decimal system required</a:t>
             </a:r>
           </a:p>
@@ -3831,48 +3791,31 @@
           </a:p>
           <a:p>
             <a:r>
-              <a:rPr lang="en-US" dirty="0" smtClean="0"/>
-              <a:t>Drop-in: </a:t>
-            </a:r>
-            <a:r>
-              <a:rPr lang="en-US" dirty="0" smtClean="0"/>
-              <a:t>Fridays, </a:t>
-            </a:r>
-            <a:r>
-              <a:rPr lang="en-US" dirty="0" smtClean="0"/>
-              <a:t>11am in </a:t>
-            </a:r>
-            <a:r>
-              <a:rPr lang="en-US" dirty="0" smtClean="0"/>
-              <a:t>S22</a:t>
-            </a:r>
-            <a:endParaRPr lang="en-US" dirty="0" smtClean="0"/>
-          </a:p>
-          <a:p>
-            <a:endParaRPr lang="en-US" dirty="0" smtClean="0"/>
+              <a:rPr lang="en-US" strike="sngStrike" dirty="0"/>
+              <a:t>Drop-in: Fridays, 11am in S22</a:t>
+            </a:r>
+          </a:p>
+          <a:p>
+            <a:endParaRPr lang="en-US" dirty="0"/>
           </a:p>
           <a:p>
             <a:r>
               <a:rPr lang="en-US" dirty="0"/>
-              <a:t>Slack channel: </a:t>
-            </a:r>
-            <a:r>
-              <a:rPr lang="en-US" dirty="0" smtClean="0"/>
-              <a:t>#python-</a:t>
-            </a:r>
-            <a:r>
-              <a:rPr lang="en-US" dirty="0" err="1" smtClean="0"/>
+              <a:t>Slack channel: #python-</a:t>
+            </a:r>
+            <a:r>
+              <a:rPr lang="en-US" dirty="0" err="1"/>
               <a:t>london</a:t>
             </a:r>
             <a:r>
-              <a:rPr lang="en-US" dirty="0" smtClean="0"/>
+              <a:rPr lang="en-US" dirty="0"/>
               <a:t>-</a:t>
             </a:r>
             <a:r>
-              <a:rPr lang="en-US" dirty="0" err="1" smtClean="0"/>
+              <a:rPr lang="en-US" dirty="0" err="1"/>
               <a:t>eca</a:t>
             </a:r>
-            <a:endParaRPr lang="en-US" dirty="0" smtClean="0"/>
+            <a:endParaRPr lang="en-US" dirty="0"/>
           </a:p>
         </p:txBody>
       </p:sp>
@@ -3916,13 +3859,6 @@
   <p:clrMapOvr>
     <a:masterClrMapping/>
   </p:clrMapOvr>
-  <p:timing>
-    <p:tnLst>
-      <p:par>
-        <p:cTn id="1" dur="indefinite" restart="never" nodeType="tmRoot"/>
-      </p:par>
-    </p:tnLst>
-  </p:timing>
 </p:sld>
 </file>
 
@@ -3960,10 +3896,9 @@
           <a:p>
             <a:pPr algn="ctr"/>
             <a:r>
-              <a:rPr lang="en-US" dirty="0" smtClean="0"/>
+              <a:rPr lang="en-US" dirty="0"/>
               <a:t>About this Course</a:t>
             </a:r>
-            <a:endParaRPr lang="en-US" dirty="0"/>
           </a:p>
         </p:txBody>
       </p:sp>
@@ -3983,19 +3918,19 @@
           <a:lstStyle/>
           <a:p>
             <a:r>
-              <a:rPr lang="en-US" dirty="0" smtClean="0"/>
+              <a:rPr lang="en-US" dirty="0"/>
               <a:t>Who am I?</a:t>
             </a:r>
           </a:p>
           <a:p>
             <a:r>
-              <a:rPr lang="en-US" dirty="0" smtClean="0"/>
+              <a:rPr lang="en-US" dirty="0"/>
               <a:t>Who are you?</a:t>
             </a:r>
           </a:p>
           <a:p>
             <a:r>
-              <a:rPr lang="en-US" dirty="0" smtClean="0"/>
+              <a:rPr lang="en-US" dirty="0"/>
               <a:t>Course Aims</a:t>
             </a:r>
           </a:p>
@@ -4041,13 +3976,6 @@
   <p:clrMapOvr>
     <a:masterClrMapping/>
   </p:clrMapOvr>
-  <p:timing>
-    <p:tnLst>
-      <p:par>
-        <p:cTn id="1" dur="indefinite" restart="never" nodeType="tmRoot"/>
-      </p:par>
-    </p:tnLst>
-  </p:timing>
 </p:sld>
 </file>
 
@@ -4132,13 +4060,6 @@
   <p:clrMapOvr>
     <a:masterClrMapping/>
   </p:clrMapOvr>
-  <p:timing>
-    <p:tnLst>
-      <p:par>
-        <p:cTn id="1" dur="indefinite" restart="never" nodeType="tmRoot"/>
-      </p:par>
-    </p:tnLst>
-  </p:timing>
 </p:sld>
 </file>
 
@@ -4206,10 +4127,9 @@
           <a:p>
             <a:pPr algn="ctr"/>
             <a:r>
-              <a:rPr lang="en-US" dirty="0" smtClean="0"/>
+              <a:rPr lang="en-US" dirty="0"/>
               <a:t>Recap: What do we need?</a:t>
             </a:r>
-            <a:endParaRPr lang="en-US" dirty="0"/>
           </a:p>
         </p:txBody>
       </p:sp>
@@ -4229,76 +4149,74 @@
           <a:lstStyle/>
           <a:p>
             <a:r>
-              <a:rPr lang="en-US" dirty="0" smtClean="0"/>
+              <a:rPr lang="en-US" dirty="0"/>
               <a:t>Python: version 2.7.x</a:t>
             </a:r>
           </a:p>
           <a:p>
             <a:r>
-              <a:rPr lang="en-US" dirty="0" smtClean="0"/>
+              <a:rPr lang="en-US" dirty="0"/>
               <a:t>A text editor:</a:t>
             </a:r>
           </a:p>
           <a:p>
             <a:pPr lvl="1"/>
             <a:r>
-              <a:rPr lang="en-US" dirty="0" smtClean="0"/>
+              <a:rPr lang="en-US" dirty="0"/>
               <a:t>Visual Studio Code</a:t>
             </a:r>
           </a:p>
           <a:p>
             <a:pPr lvl="1"/>
             <a:r>
-              <a:rPr lang="en-US" dirty="0" smtClean="0"/>
+              <a:rPr lang="en-US" dirty="0"/>
               <a:t>Sublime Text</a:t>
             </a:r>
           </a:p>
           <a:p>
             <a:pPr lvl="1"/>
             <a:r>
-              <a:rPr lang="en-US" dirty="0" err="1" smtClean="0"/>
+              <a:rPr lang="en-US" dirty="0" err="1"/>
               <a:t>PyCharm</a:t>
             </a:r>
             <a:r>
-              <a:rPr lang="en-US" dirty="0" smtClean="0"/>
+              <a:rPr lang="en-US" dirty="0"/>
               <a:t> Community Edition</a:t>
             </a:r>
           </a:p>
           <a:p>
             <a:pPr lvl="1"/>
             <a:r>
-              <a:rPr lang="en-US" dirty="0" smtClean="0"/>
+              <a:rPr lang="en-US" dirty="0"/>
               <a:t>Anything with syntax highlighting</a:t>
             </a:r>
             <a:br>
-              <a:rPr lang="en-US" dirty="0" smtClean="0"/>
+              <a:rPr lang="en-US" dirty="0"/>
             </a:br>
             <a:r>
-              <a:rPr lang="en-US" dirty="0" smtClean="0"/>
+              <a:rPr lang="en-US" dirty="0"/>
               <a:t>for Python</a:t>
             </a:r>
-            <a:endParaRPr lang="en-US" dirty="0"/>
-          </a:p>
-          <a:p>
-            <a:r>
-              <a:rPr lang="en-US" dirty="0" smtClean="0"/>
+          </a:p>
+          <a:p>
+            <a:r>
+              <a:rPr lang="en-US" dirty="0"/>
               <a:t>Do not use:</a:t>
             </a:r>
           </a:p>
           <a:p>
             <a:pPr lvl="1"/>
             <a:r>
-              <a:rPr lang="en-US" dirty="0" smtClean="0"/>
+              <a:rPr lang="en-US" dirty="0"/>
               <a:t>Notepad</a:t>
             </a:r>
           </a:p>
           <a:p>
             <a:pPr lvl="1"/>
             <a:r>
-              <a:rPr lang="en-US" dirty="0" smtClean="0"/>
+              <a:rPr lang="en-US" dirty="0"/>
               <a:t>Notepad++</a:t>
             </a:r>
-            <a:endParaRPr lang="en-US" dirty="0"/>
           </a:p>
         </p:txBody>
       </p:sp>
@@ -4342,13 +4260,6 @@
   <p:clrMapOvr>
     <a:masterClrMapping/>
   </p:clrMapOvr>
-  <p:timing>
-    <p:tnLst>
-      <p:par>
-        <p:cTn id="1" dur="indefinite" restart="never" nodeType="tmRoot"/>
-      </p:par>
-    </p:tnLst>
-  </p:timing>
 </p:sld>
 </file>
 
@@ -4386,10 +4297,9 @@
           <a:p>
             <a:pPr algn="ctr"/>
             <a:r>
-              <a:rPr lang="en-US" dirty="0" smtClean="0"/>
+              <a:rPr lang="en-US" dirty="0"/>
               <a:t>Recap: What went before</a:t>
             </a:r>
-            <a:endParaRPr lang="en-US" dirty="0"/>
           </a:p>
         </p:txBody>
       </p:sp>
@@ -4416,22 +4326,16 @@
               <a:rPr lang="en-US" dirty="0">
                 <a:hlinkClick r:id="rId2"/>
               </a:rPr>
-              <a:t>http://</a:t>
-            </a:r>
-            <a:r>
-              <a:rPr lang="en-US" dirty="0" smtClean="0">
-                <a:hlinkClick r:id="rId2"/>
-              </a:rPr>
-              <a:t>go/5yvhzuq8</a:t>
-            </a:r>
-            <a:endParaRPr lang="en-US" dirty="0" smtClean="0"/>
-          </a:p>
-          <a:p>
+              <a:t>http://go/5yvhzuq8</a:t>
+            </a:r>
             <a:endParaRPr lang="en-US" dirty="0"/>
           </a:p>
           <a:p>
-            <a:r>
-              <a:rPr lang="en-US" dirty="0" smtClean="0"/>
+            <a:endParaRPr lang="en-US" dirty="0"/>
+          </a:p>
+          <a:p>
+            <a:r>
+              <a:rPr lang="en-US" dirty="0"/>
               <a:t>Download it and open it in your preferred editor</a:t>
             </a:r>
           </a:p>
@@ -4440,12 +4344,12 @@
           </a:p>
           <a:p>
             <a:r>
-              <a:rPr lang="en-US" dirty="0" smtClean="0"/>
+              <a:rPr lang="en-US" dirty="0"/>
               <a:t>Let’s work through what it does.</a:t>
             </a:r>
           </a:p>
           <a:p>
-            <a:endParaRPr lang="en-US" dirty="0" smtClean="0"/>
+            <a:endParaRPr lang="en-US" dirty="0"/>
           </a:p>
         </p:txBody>
       </p:sp>
@@ -4489,13 +4393,6 @@
   <p:clrMapOvr>
     <a:masterClrMapping/>
   </p:clrMapOvr>
-  <p:timing>
-    <p:tnLst>
-      <p:par>
-        <p:cTn id="1" dur="indefinite" restart="never" nodeType="tmRoot"/>
-      </p:par>
-    </p:tnLst>
-  </p:timing>
 </p:sld>
 </file>
 
@@ -4533,10 +4430,9 @@
           <a:p>
             <a:pPr algn="ctr"/>
             <a:r>
-              <a:rPr lang="en-US" dirty="0" smtClean="0"/>
+              <a:rPr lang="en-US" dirty="0"/>
               <a:t>Recap: What went before</a:t>
             </a:r>
-            <a:endParaRPr lang="en-US" dirty="0"/>
           </a:p>
         </p:txBody>
       </p:sp>
@@ -4563,22 +4459,16 @@
               <a:rPr lang="en-US" dirty="0">
                 <a:hlinkClick r:id="rId2"/>
               </a:rPr>
-              <a:t>http://</a:t>
-            </a:r>
-            <a:r>
-              <a:rPr lang="en-US" dirty="0" smtClean="0">
-                <a:hlinkClick r:id="rId2"/>
-              </a:rPr>
-              <a:t>go/5yvhzuq8</a:t>
-            </a:r>
-            <a:endParaRPr lang="en-US" dirty="0" smtClean="0"/>
-          </a:p>
-          <a:p>
+              <a:t>http://go/5yvhzuq8</a:t>
+            </a:r>
             <a:endParaRPr lang="en-US" dirty="0"/>
           </a:p>
           <a:p>
-            <a:r>
-              <a:rPr lang="en-US" dirty="0" smtClean="0"/>
+            <a:endParaRPr lang="en-US" dirty="0"/>
+          </a:p>
+          <a:p>
+            <a:r>
+              <a:rPr lang="en-US" dirty="0"/>
               <a:t>Download it and load it into your preferred editor</a:t>
             </a:r>
           </a:p>
@@ -4587,7 +4477,7 @@
           </a:p>
           <a:p>
             <a:r>
-              <a:rPr lang="en-US" dirty="0" smtClean="0"/>
+              <a:rPr lang="en-US" dirty="0"/>
               <a:t>Let’s work through what it does.</a:t>
             </a:r>
           </a:p>
@@ -4596,32 +4486,22 @@
           </a:p>
           <a:p>
             <a:r>
-              <a:rPr lang="en-US" dirty="0" smtClean="0"/>
-              <a:t>restaurants-lesson1.csv </a:t>
-            </a:r>
-            <a:r>
               <a:rPr lang="en-US" dirty="0"/>
-              <a:t>is at </a:t>
+              <a:t>restaurants-lesson1.csv is at </a:t>
             </a:r>
             <a:r>
               <a:rPr lang="en-US" dirty="0">
                 <a:hlinkClick r:id="rId3"/>
               </a:rPr>
-              <a:t>http://</a:t>
-            </a:r>
-            <a:r>
-              <a:rPr lang="en-US" dirty="0" smtClean="0">
-                <a:hlinkClick r:id="rId3"/>
-              </a:rPr>
-              <a:t>go/qzu9f-8p</a:t>
-            </a:r>
-            <a:endParaRPr lang="en-US" dirty="0" smtClean="0"/>
-          </a:p>
-          <a:p>
+              <a:t>http://go/qzu9f-8p</a:t>
+            </a:r>
             <a:endParaRPr lang="en-US" dirty="0"/>
           </a:p>
           <a:p>
-            <a:endParaRPr lang="en-US" dirty="0" smtClean="0"/>
+            <a:endParaRPr lang="en-US" dirty="0"/>
+          </a:p>
+          <a:p>
+            <a:endParaRPr lang="en-US" dirty="0"/>
           </a:p>
         </p:txBody>
       </p:sp>
@@ -4665,13 +4545,6 @@
   <p:clrMapOvr>
     <a:masterClrMapping/>
   </p:clrMapOvr>
-  <p:timing>
-    <p:tnLst>
-      <p:par>
-        <p:cTn id="1" dur="indefinite" restart="never" nodeType="tmRoot"/>
-      </p:par>
-    </p:tnLst>
-  </p:timing>
 </p:sld>
 </file>
 
@@ -4709,39 +4582,38 @@
           <a:p>
             <a:pPr algn="ctr"/>
             <a:r>
-              <a:rPr lang="en-US" dirty="0" smtClean="0"/>
+              <a:rPr lang="en-US" dirty="0"/>
               <a:t>What doesn’t it do?</a:t>
             </a:r>
+          </a:p>
+        </p:txBody>
+      </p:sp>
+      <p:sp>
+        <p:nvSpPr>
+          <p:cNvPr id="3" name="Content Placeholder 2"/>
+          <p:cNvSpPr>
+            <a:spLocks noGrp="1"/>
+          </p:cNvSpPr>
+          <p:nvPr>
+            <p:ph idx="1"/>
+          </p:nvPr>
+        </p:nvSpPr>
+        <p:spPr/>
+        <p:txBody>
+          <a:bodyPr/>
+          <a:lstStyle/>
+          <a:p>
+            <a:r>
+              <a:rPr lang="en-US" dirty="0"/>
+              <a:t>What restrictions should be on the inputs?</a:t>
+            </a:r>
+          </a:p>
+          <a:p>
             <a:endParaRPr lang="en-US" dirty="0"/>
           </a:p>
-        </p:txBody>
-      </p:sp>
-      <p:sp>
-        <p:nvSpPr>
-          <p:cNvPr id="3" name="Content Placeholder 2"/>
-          <p:cNvSpPr>
-            <a:spLocks noGrp="1"/>
-          </p:cNvSpPr>
-          <p:nvPr>
-            <p:ph idx="1"/>
-          </p:nvPr>
-        </p:nvSpPr>
-        <p:spPr/>
-        <p:txBody>
-          <a:bodyPr/>
-          <a:lstStyle/>
-          <a:p>
-            <a:r>
-              <a:rPr lang="en-US" dirty="0" smtClean="0"/>
-              <a:t>What restrictions should be on the inputs?</a:t>
-            </a:r>
-          </a:p>
-          <a:p>
-            <a:endParaRPr lang="en-US" dirty="0"/>
-          </a:p>
-          <a:p>
-            <a:r>
-              <a:rPr lang="en-US" dirty="0" smtClean="0"/>
+          <a:p>
+            <a:r>
+              <a:rPr lang="en-US" dirty="0"/>
               <a:t>Can you add a restriction to only allow the user to input numbers between 1 and 5 when searching on rating?</a:t>
             </a:r>
           </a:p>
@@ -4787,13 +4659,6 @@
   <p:clrMapOvr>
     <a:masterClrMapping/>
   </p:clrMapOvr>
-  <p:timing>
-    <p:tnLst>
-      <p:par>
-        <p:cTn id="1" dur="indefinite" restart="never" nodeType="tmRoot"/>
-      </p:par>
-    </p:tnLst>
-  </p:timing>
 </p:sld>
 </file>
 
@@ -4831,10 +4696,9 @@
           <a:p>
             <a:pPr algn="ctr"/>
             <a:r>
-              <a:rPr lang="en-US" dirty="0" smtClean="0"/>
+              <a:rPr lang="en-US" dirty="0"/>
               <a:t>Did you come up with something like this?</a:t>
             </a:r>
-            <a:endParaRPr lang="en-US" dirty="0"/>
           </a:p>
         </p:txBody>
       </p:sp>
@@ -4891,10 +4755,9 @@
           <a:lstStyle/>
           <a:p>
             <a:r>
-              <a:rPr lang="en-US" dirty="0" smtClean="0"/>
+              <a:rPr lang="en-US" dirty="0"/>
               <a:t>Great! But there’s still a problem. What is it?</a:t>
             </a:r>
-            <a:endParaRPr lang="en-US" dirty="0"/>
           </a:p>
         </p:txBody>
       </p:sp>
@@ -4937,13 +4800,6 @@
   <p:clrMapOvr>
     <a:masterClrMapping/>
   </p:clrMapOvr>
-  <p:timing>
-    <p:tnLst>
-      <p:par>
-        <p:cTn id="1" dur="indefinite" restart="never" nodeType="tmRoot"/>
-      </p:par>
-    </p:tnLst>
-  </p:timing>
 </p:sld>
 </file>
 
@@ -4981,10 +4837,9 @@
           <a:p>
             <a:pPr algn="ctr"/>
             <a:r>
-              <a:rPr lang="en-US" dirty="0" smtClean="0"/>
+              <a:rPr lang="en-US" dirty="0"/>
               <a:t>Let’s make an exception!</a:t>
             </a:r>
-            <a:endParaRPr lang="en-US" dirty="0"/>
           </a:p>
         </p:txBody>
       </p:sp>
@@ -5004,29 +4859,29 @@
           <a:lstStyle/>
           <a:p>
             <a:r>
-              <a:rPr lang="en-US" dirty="0" smtClean="0"/>
+              <a:rPr lang="en-US" dirty="0"/>
               <a:t>Try to do something</a:t>
             </a:r>
           </a:p>
           <a:p>
             <a:r>
-              <a:rPr lang="en-US" dirty="0" smtClean="0"/>
+              <a:rPr lang="en-US" dirty="0"/>
               <a:t>If that fails do something else (or don’t)</a:t>
             </a:r>
           </a:p>
           <a:p>
             <a:r>
-              <a:rPr lang="en-US" dirty="0" smtClean="0"/>
+              <a:rPr lang="en-US" dirty="0"/>
               <a:t>Finally, optionally, do something else</a:t>
             </a:r>
           </a:p>
           <a:p>
             <a:r>
-              <a:rPr lang="en-US" dirty="0" smtClean="0"/>
+              <a:rPr lang="en-US" dirty="0"/>
               <a:t>You can have multiple </a:t>
             </a:r>
             <a:r>
-              <a:rPr lang="en-US" dirty="0" smtClean="0">
+              <a:rPr lang="en-US" dirty="0">
                 <a:latin typeface="Consolas" charset="0"/>
                 <a:ea typeface="Consolas" charset="0"/>
                 <a:cs typeface="Consolas" charset="0"/>
@@ -5034,7 +4889,7 @@
               <a:t>except</a:t>
             </a:r>
             <a:r>
-              <a:rPr lang="en-US" dirty="0" smtClean="0"/>
+              <a:rPr lang="en-US" dirty="0"/>
               <a:t> blocks for different exceptions</a:t>
             </a:r>
           </a:p>
@@ -5116,13 +4971,6 @@
   <p:clrMapOvr>
     <a:masterClrMapping/>
   </p:clrMapOvr>
-  <p:timing>
-    <p:tnLst>
-      <p:par>
-        <p:cTn id="1" dur="indefinite" restart="never" nodeType="tmRoot"/>
-      </p:par>
-    </p:tnLst>
-  </p:timing>
 </p:sld>
 </file>
 

</xml_diff>

<commit_message>
Push correct version of slides
</commit_message>
<xml_diff>
--- a/Python Level 2/Lesson 1/Session 1.pptx
+++ b/Python Level 2/Lesson 1/Session 1.pptx
@@ -207,7 +207,7 @@
           <a:p>
             <a:fld id="{E700A533-32BB-7A4E-AE6B-F0A2BE39E8B0}" type="datetimeFigureOut">
               <a:rPr lang="en-US" smtClean="0"/>
-              <a:t>5/16/18</a:t>
+              <a:t>8/30/18</a:t>
             </a:fld>
             <a:endParaRPr lang="en-US"/>
           </a:p>
@@ -779,7 +779,7 @@
           <a:p>
             <a:fld id="{F86DE704-5A85-4041-9FC6-7273780BCBF6}" type="datetimeFigureOut">
               <a:rPr lang="en-US" smtClean="0"/>
-              <a:t>5/16/18</a:t>
+              <a:t>8/30/18</a:t>
             </a:fld>
             <a:endParaRPr lang="en-US"/>
           </a:p>
@@ -947,7 +947,7 @@
           <a:p>
             <a:fld id="{F86DE704-5A85-4041-9FC6-7273780BCBF6}" type="datetimeFigureOut">
               <a:rPr lang="en-US" smtClean="0"/>
-              <a:t>5/16/18</a:t>
+              <a:t>8/30/18</a:t>
             </a:fld>
             <a:endParaRPr lang="en-US"/>
           </a:p>
@@ -1125,7 +1125,7 @@
           <a:p>
             <a:fld id="{F86DE704-5A85-4041-9FC6-7273780BCBF6}" type="datetimeFigureOut">
               <a:rPr lang="en-US" smtClean="0"/>
-              <a:t>5/16/18</a:t>
+              <a:t>8/30/18</a:t>
             </a:fld>
             <a:endParaRPr lang="en-US"/>
           </a:p>
@@ -1293,7 +1293,7 @@
           <a:p>
             <a:fld id="{F86DE704-5A85-4041-9FC6-7273780BCBF6}" type="datetimeFigureOut">
               <a:rPr lang="en-US" smtClean="0"/>
-              <a:t>5/16/18</a:t>
+              <a:t>8/30/18</a:t>
             </a:fld>
             <a:endParaRPr lang="en-US"/>
           </a:p>
@@ -1538,7 +1538,7 @@
           <a:p>
             <a:fld id="{F86DE704-5A85-4041-9FC6-7273780BCBF6}" type="datetimeFigureOut">
               <a:rPr lang="en-US" smtClean="0"/>
-              <a:t>5/16/18</a:t>
+              <a:t>8/30/18</a:t>
             </a:fld>
             <a:endParaRPr lang="en-US"/>
           </a:p>
@@ -1767,7 +1767,7 @@
           <a:p>
             <a:fld id="{F86DE704-5A85-4041-9FC6-7273780BCBF6}" type="datetimeFigureOut">
               <a:rPr lang="en-US" smtClean="0"/>
-              <a:t>5/16/18</a:t>
+              <a:t>8/30/18</a:t>
             </a:fld>
             <a:endParaRPr lang="en-US"/>
           </a:p>
@@ -2131,7 +2131,7 @@
           <a:p>
             <a:fld id="{F86DE704-5A85-4041-9FC6-7273780BCBF6}" type="datetimeFigureOut">
               <a:rPr lang="en-US" smtClean="0"/>
-              <a:t>5/16/18</a:t>
+              <a:t>8/30/18</a:t>
             </a:fld>
             <a:endParaRPr lang="en-US"/>
           </a:p>
@@ -2248,7 +2248,7 @@
           <a:p>
             <a:fld id="{F86DE704-5A85-4041-9FC6-7273780BCBF6}" type="datetimeFigureOut">
               <a:rPr lang="en-US" smtClean="0"/>
-              <a:t>5/16/18</a:t>
+              <a:t>8/30/18</a:t>
             </a:fld>
             <a:endParaRPr lang="en-US"/>
           </a:p>
@@ -2343,7 +2343,7 @@
           <a:p>
             <a:fld id="{F86DE704-5A85-4041-9FC6-7273780BCBF6}" type="datetimeFigureOut">
               <a:rPr lang="en-US" smtClean="0"/>
-              <a:t>5/16/18</a:t>
+              <a:t>8/30/18</a:t>
             </a:fld>
             <a:endParaRPr lang="en-US"/>
           </a:p>
@@ -2618,7 +2618,7 @@
           <a:p>
             <a:fld id="{F86DE704-5A85-4041-9FC6-7273780BCBF6}" type="datetimeFigureOut">
               <a:rPr lang="en-US" smtClean="0"/>
-              <a:t>5/16/18</a:t>
+              <a:t>8/30/18</a:t>
             </a:fld>
             <a:endParaRPr lang="en-US"/>
           </a:p>
@@ -2870,7 +2870,7 @@
           <a:p>
             <a:fld id="{F86DE704-5A85-4041-9FC6-7273780BCBF6}" type="datetimeFigureOut">
               <a:rPr lang="en-US" smtClean="0"/>
-              <a:t>5/16/18</a:t>
+              <a:t>8/30/18</a:t>
             </a:fld>
             <a:endParaRPr lang="en-US"/>
           </a:p>
@@ -3081,7 +3081,7 @@
           <a:p>
             <a:fld id="{F86DE704-5A85-4041-9FC6-7273780BCBF6}" type="datetimeFigureOut">
               <a:rPr lang="en-US" smtClean="0"/>
-              <a:t>5/16/18</a:t>
+              <a:t>8/30/18</a:t>
             </a:fld>
             <a:endParaRPr lang="en-US"/>
           </a:p>
@@ -3630,7 +3630,13 @@
       </p:sp>
       <p:pic>
         <p:nvPicPr>
-          <p:cNvPr id="8" name="Content Placeholder 7"/>
+          <p:cNvPr id="7" name="Content Placeholder 6">
+            <a:extLst>
+              <a:ext uri="{FF2B5EF4-FFF2-40B4-BE49-F238E27FC236}">
+                <a16:creationId xmlns:a16="http://schemas.microsoft.com/office/drawing/2014/main" id="{00B3D4A0-AEA6-F54F-ACEE-A25E250DA303}"/>
+              </a:ext>
+            </a:extLst>
+          </p:cNvPr>
           <p:cNvPicPr>
             <a:picLocks noGrp="1" noChangeAspect="1"/>
           </p:cNvPicPr>
@@ -3639,21 +3645,15 @@
           </p:nvPr>
         </p:nvPicPr>
         <p:blipFill>
-          <a:blip r:embed="rId2">
-            <a:extLst>
-              <a:ext uri="{28A0092B-C50C-407E-A947-70E740481C1C}">
-                <a14:useLocalDpi xmlns:a14="http://schemas.microsoft.com/office/drawing/2010/main" val="0"/>
-              </a:ext>
-            </a:extLst>
-          </a:blip>
+          <a:blip r:embed="rId2"/>
           <a:stretch>
             <a:fillRect/>
           </a:stretch>
         </p:blipFill>
         <p:spPr>
           <a:xfrm>
-            <a:off x="1416050" y="1931375"/>
-            <a:ext cx="9359900" cy="4000500"/>
+            <a:off x="1995569" y="1690688"/>
+            <a:ext cx="8200862" cy="4351338"/>
           </a:xfrm>
         </p:spPr>
       </p:pic>
@@ -3758,7 +3758,7 @@
         <p:spPr/>
         <p:txBody>
           <a:bodyPr>
-            <a:normAutofit lnSpcReduction="10000"/>
+            <a:normAutofit/>
           </a:bodyPr>
           <a:lstStyle/>
           <a:p>
@@ -3787,15 +3787,9 @@
             </a:r>
           </a:p>
           <a:p>
-            <a:endParaRPr lang="en-US" dirty="0"/>
-          </a:p>
-          <a:p>
-            <a:r>
-              <a:rPr lang="en-US" strike="sngStrike" dirty="0"/>
-              <a:t>Drop-in: Fridays, 11am in S22</a:t>
-            </a:r>
-          </a:p>
-          <a:p>
+            <a:pPr marL="0" indent="0">
+              <a:buNone/>
+            </a:pPr>
             <a:endParaRPr lang="en-US" dirty="0"/>
           </a:p>
           <a:p>
@@ -4150,7 +4144,7 @@
           <a:p>
             <a:r>
               <a:rPr lang="en-US" dirty="0"/>
-              <a:t>Python: version 2.7.x</a:t>
+              <a:t>Python: version 3.5.x (or better)</a:t>
             </a:r>
           </a:p>
           <a:p>
@@ -4763,7 +4757,13 @@
       </p:sp>
       <p:pic>
         <p:nvPicPr>
-          <p:cNvPr id="7" name="Content Placeholder 6"/>
+          <p:cNvPr id="8" name="Content Placeholder 7">
+            <a:extLst>
+              <a:ext uri="{FF2B5EF4-FFF2-40B4-BE49-F238E27FC236}">
+                <a16:creationId xmlns:a16="http://schemas.microsoft.com/office/drawing/2014/main" id="{D26D7C1B-9E24-DE49-AFE8-A9D134CB1568}"/>
+              </a:ext>
+            </a:extLst>
+          </p:cNvPr>
           <p:cNvPicPr>
             <a:picLocks noGrp="1" noChangeAspect="1"/>
           </p:cNvPicPr>
@@ -4772,21 +4772,15 @@
           </p:nvPr>
         </p:nvPicPr>
         <p:blipFill>
-          <a:blip r:embed="rId3">
-            <a:extLst>
-              <a:ext uri="{28A0092B-C50C-407E-A947-70E740481C1C}">
-                <a14:useLocalDpi xmlns:a14="http://schemas.microsoft.com/office/drawing/2010/main" val="0"/>
-              </a:ext>
-            </a:extLst>
-          </a:blip>
+          <a:blip r:embed="rId3"/>
           <a:stretch>
             <a:fillRect/>
           </a:stretch>
         </p:blipFill>
         <p:spPr>
           <a:xfrm>
-            <a:off x="1727200" y="2109881"/>
-            <a:ext cx="8737600" cy="2095500"/>
+            <a:off x="1802412" y="1944939"/>
+            <a:ext cx="8587176" cy="2425385"/>
           </a:xfrm>
         </p:spPr>
       </p:pic>

</xml_diff>

<commit_message>
More 11th hour fixes
</commit_message>
<xml_diff>
--- a/Python Level 2/Lesson 1/Session 1.pptx
+++ b/Python Level 2/Lesson 1/Session 1.pptx
@@ -207,7 +207,7 @@
           <a:p>
             <a:fld id="{E700A533-32BB-7A4E-AE6B-F0A2BE39E8B0}" type="datetimeFigureOut">
               <a:rPr lang="en-US" smtClean="0"/>
-              <a:t>8/30/18</a:t>
+              <a:t>9/25/18</a:t>
             </a:fld>
             <a:endParaRPr lang="en-US"/>
           </a:p>
@@ -602,6 +602,90 @@
           <a:bodyPr/>
           <a:lstStyle/>
           <a:p>
+            <a:endParaRPr lang="en-US" dirty="0"/>
+          </a:p>
+        </p:txBody>
+      </p:sp>
+      <p:sp>
+        <p:nvSpPr>
+          <p:cNvPr id="4" name="Slide Number Placeholder 3"/>
+          <p:cNvSpPr>
+            <a:spLocks noGrp="1"/>
+          </p:cNvSpPr>
+          <p:nvPr>
+            <p:ph type="sldNum" sz="quarter" idx="5"/>
+          </p:nvPr>
+        </p:nvSpPr>
+        <p:spPr/>
+        <p:txBody>
+          <a:bodyPr/>
+          <a:lstStyle/>
+          <a:p>
+            <a:fld id="{CE4D06AB-E4DB-4A49-93DE-CC1A05FF936A}" type="slidenum">
+              <a:rPr lang="en-US" smtClean="0"/>
+              <a:t>10</a:t>
+            </a:fld>
+            <a:endParaRPr lang="en-US"/>
+          </a:p>
+        </p:txBody>
+      </p:sp>
+    </p:spTree>
+    <p:extLst>
+      <p:ext uri="{BB962C8B-B14F-4D97-AF65-F5344CB8AC3E}">
+        <p14:creationId xmlns:p14="http://schemas.microsoft.com/office/powerpoint/2010/main" val="3856340324"/>
+      </p:ext>
+    </p:extLst>
+  </p:cSld>
+  <p:clrMapOvr>
+    <a:masterClrMapping/>
+  </p:clrMapOvr>
+</p:notes>
+</file>
+
+<file path=ppt/notesSlides/notesSlide3.xml><?xml version="1.0" encoding="utf-8"?>
+<p:notes xmlns:a="http://schemas.openxmlformats.org/drawingml/2006/main" xmlns:r="http://schemas.openxmlformats.org/officeDocument/2006/relationships" xmlns:p="http://schemas.openxmlformats.org/presentationml/2006/main">
+  <p:cSld>
+    <p:spTree>
+      <p:nvGrpSpPr>
+        <p:cNvPr id="1" name=""/>
+        <p:cNvGrpSpPr/>
+        <p:nvPr/>
+      </p:nvGrpSpPr>
+      <p:grpSpPr>
+        <a:xfrm>
+          <a:off x="0" y="0"/>
+          <a:ext cx="0" cy="0"/>
+          <a:chOff x="0" y="0"/>
+          <a:chExt cx="0" cy="0"/>
+        </a:xfrm>
+      </p:grpSpPr>
+      <p:sp>
+        <p:nvSpPr>
+          <p:cNvPr id="2" name="Slide Image Placeholder 1"/>
+          <p:cNvSpPr>
+            <a:spLocks noGrp="1" noRot="1" noChangeAspect="1"/>
+          </p:cNvSpPr>
+          <p:nvPr>
+            <p:ph type="sldImg"/>
+          </p:nvPr>
+        </p:nvSpPr>
+        <p:spPr/>
+      </p:sp>
+      <p:sp>
+        <p:nvSpPr>
+          <p:cNvPr id="3" name="Notes Placeholder 2"/>
+          <p:cNvSpPr>
+            <a:spLocks noGrp="1"/>
+          </p:cNvSpPr>
+          <p:nvPr>
+            <p:ph type="body" idx="1"/>
+          </p:nvPr>
+        </p:nvSpPr>
+        <p:spPr/>
+        <p:txBody>
+          <a:bodyPr/>
+          <a:lstStyle/>
+          <a:p>
             <a:r>
               <a:rPr lang="en-US" dirty="0"/>
               <a:t>Extra credit: what</a:t>
@@ -779,7 +863,7 @@
           <a:p>
             <a:fld id="{F86DE704-5A85-4041-9FC6-7273780BCBF6}" type="datetimeFigureOut">
               <a:rPr lang="en-US" smtClean="0"/>
-              <a:t>8/30/18</a:t>
+              <a:t>9/25/18</a:t>
             </a:fld>
             <a:endParaRPr lang="en-US"/>
           </a:p>
@@ -947,7 +1031,7 @@
           <a:p>
             <a:fld id="{F86DE704-5A85-4041-9FC6-7273780BCBF6}" type="datetimeFigureOut">
               <a:rPr lang="en-US" smtClean="0"/>
-              <a:t>8/30/18</a:t>
+              <a:t>9/25/18</a:t>
             </a:fld>
             <a:endParaRPr lang="en-US"/>
           </a:p>
@@ -1125,7 +1209,7 @@
           <a:p>
             <a:fld id="{F86DE704-5A85-4041-9FC6-7273780BCBF6}" type="datetimeFigureOut">
               <a:rPr lang="en-US" smtClean="0"/>
-              <a:t>8/30/18</a:t>
+              <a:t>9/25/18</a:t>
             </a:fld>
             <a:endParaRPr lang="en-US"/>
           </a:p>
@@ -1293,7 +1377,7 @@
           <a:p>
             <a:fld id="{F86DE704-5A85-4041-9FC6-7273780BCBF6}" type="datetimeFigureOut">
               <a:rPr lang="en-US" smtClean="0"/>
-              <a:t>8/30/18</a:t>
+              <a:t>9/25/18</a:t>
             </a:fld>
             <a:endParaRPr lang="en-US"/>
           </a:p>
@@ -1538,7 +1622,7 @@
           <a:p>
             <a:fld id="{F86DE704-5A85-4041-9FC6-7273780BCBF6}" type="datetimeFigureOut">
               <a:rPr lang="en-US" smtClean="0"/>
-              <a:t>8/30/18</a:t>
+              <a:t>9/25/18</a:t>
             </a:fld>
             <a:endParaRPr lang="en-US"/>
           </a:p>
@@ -1767,7 +1851,7 @@
           <a:p>
             <a:fld id="{F86DE704-5A85-4041-9FC6-7273780BCBF6}" type="datetimeFigureOut">
               <a:rPr lang="en-US" smtClean="0"/>
-              <a:t>8/30/18</a:t>
+              <a:t>9/25/18</a:t>
             </a:fld>
             <a:endParaRPr lang="en-US"/>
           </a:p>
@@ -2131,7 +2215,7 @@
           <a:p>
             <a:fld id="{F86DE704-5A85-4041-9FC6-7273780BCBF6}" type="datetimeFigureOut">
               <a:rPr lang="en-US" smtClean="0"/>
-              <a:t>8/30/18</a:t>
+              <a:t>9/25/18</a:t>
             </a:fld>
             <a:endParaRPr lang="en-US"/>
           </a:p>
@@ -2248,7 +2332,7 @@
           <a:p>
             <a:fld id="{F86DE704-5A85-4041-9FC6-7273780BCBF6}" type="datetimeFigureOut">
               <a:rPr lang="en-US" smtClean="0"/>
-              <a:t>8/30/18</a:t>
+              <a:t>9/25/18</a:t>
             </a:fld>
             <a:endParaRPr lang="en-US"/>
           </a:p>
@@ -2343,7 +2427,7 @@
           <a:p>
             <a:fld id="{F86DE704-5A85-4041-9FC6-7273780BCBF6}" type="datetimeFigureOut">
               <a:rPr lang="en-US" smtClean="0"/>
-              <a:t>8/30/18</a:t>
+              <a:t>9/25/18</a:t>
             </a:fld>
             <a:endParaRPr lang="en-US"/>
           </a:p>
@@ -2618,7 +2702,7 @@
           <a:p>
             <a:fld id="{F86DE704-5A85-4041-9FC6-7273780BCBF6}" type="datetimeFigureOut">
               <a:rPr lang="en-US" smtClean="0"/>
-              <a:t>8/30/18</a:t>
+              <a:t>9/25/18</a:t>
             </a:fld>
             <a:endParaRPr lang="en-US"/>
           </a:p>
@@ -2870,7 +2954,7 @@
           <a:p>
             <a:fld id="{F86DE704-5A85-4041-9FC6-7273780BCBF6}" type="datetimeFigureOut">
               <a:rPr lang="en-US" smtClean="0"/>
-              <a:t>8/30/18</a:t>
+              <a:t>9/25/18</a:t>
             </a:fld>
             <a:endParaRPr lang="en-US"/>
           </a:p>
@@ -3081,7 +3165,7 @@
           <a:p>
             <a:fld id="{F86DE704-5A85-4041-9FC6-7273780BCBF6}" type="datetimeFigureOut">
               <a:rPr lang="en-US" smtClean="0"/>
-              <a:t>8/30/18</a:t>
+              <a:t>9/25/18</a:t>
             </a:fld>
             <a:endParaRPr lang="en-US"/>
           </a:p>
@@ -3630,10 +3714,10 @@
       </p:sp>
       <p:pic>
         <p:nvPicPr>
-          <p:cNvPr id="7" name="Content Placeholder 6">
+          <p:cNvPr id="8" name="Content Placeholder 7">
             <a:extLst>
               <a:ext uri="{FF2B5EF4-FFF2-40B4-BE49-F238E27FC236}">
-                <a16:creationId xmlns:a16="http://schemas.microsoft.com/office/drawing/2014/main" id="{00B3D4A0-AEA6-F54F-ACEE-A25E250DA303}"/>
+                <a16:creationId xmlns:a16="http://schemas.microsoft.com/office/drawing/2014/main" id="{7C98E012-127D-E744-8EFC-031B9E6293D0}"/>
               </a:ext>
             </a:extLst>
           </p:cNvPr>
@@ -3645,15 +3729,15 @@
           </p:nvPr>
         </p:nvPicPr>
         <p:blipFill>
-          <a:blip r:embed="rId2"/>
+          <a:blip r:embed="rId3"/>
           <a:stretch>
             <a:fillRect/>
           </a:stretch>
         </p:blipFill>
         <p:spPr>
           <a:xfrm>
-            <a:off x="1995569" y="1690688"/>
-            <a:ext cx="8200862" cy="4351338"/>
+            <a:off x="1673458" y="1825625"/>
+            <a:ext cx="8845083" cy="4351338"/>
           </a:xfrm>
         </p:spPr>
       </p:pic>
@@ -3666,7 +3750,7 @@
           <p:nvPr/>
         </p:nvPicPr>
         <p:blipFill>
-          <a:blip r:embed="rId3">
+          <a:blip r:embed="rId4">
             <a:extLst>
               <a:ext uri="{28A0092B-C50C-407E-A947-70E740481C1C}">
                 <a14:useLocalDpi xmlns:a14="http://schemas.microsoft.com/office/drawing/2010/main" val="0"/>

</xml_diff>